<commit_message>
Adicionada a opção para andar nas diagonais
</commit_message>
<xml_diff>
--- a/Docs/Apresentacao-nova.pptx
+++ b/Docs/Apresentacao-nova.pptx
@@ -5,7 +5,7 @@
     <p:sldMasterId id="2147483816" r:id="rId1"/>
   </p:sldMasterIdLst>
   <p:notesMasterIdLst>
-    <p:notesMasterId r:id="rId28"/>
+    <p:notesMasterId r:id="rId26"/>
   </p:notesMasterIdLst>
   <p:sldIdLst>
     <p:sldId id="256" r:id="rId2"/>
@@ -27,13 +27,11 @@
     <p:sldId id="280" r:id="rId18"/>
     <p:sldId id="271" r:id="rId19"/>
     <p:sldId id="272" r:id="rId20"/>
-    <p:sldId id="273" r:id="rId21"/>
-    <p:sldId id="274" r:id="rId22"/>
-    <p:sldId id="275" r:id="rId23"/>
-    <p:sldId id="276" r:id="rId24"/>
-    <p:sldId id="277" r:id="rId25"/>
-    <p:sldId id="278" r:id="rId26"/>
-    <p:sldId id="279" r:id="rId27"/>
+    <p:sldId id="275" r:id="rId21"/>
+    <p:sldId id="276" r:id="rId22"/>
+    <p:sldId id="277" r:id="rId23"/>
+    <p:sldId id="278" r:id="rId24"/>
+    <p:sldId id="279" r:id="rId25"/>
   </p:sldIdLst>
   <p:sldSz cx="9144000" cy="6858000" type="screen4x3"/>
   <p:notesSz cx="6858000" cy="9144000"/>
@@ -132,6 +130,22 @@
       </a:defRPr>
     </a:lvl9pPr>
   </p:defaultTextStyle>
+  <p:extLst>
+    <p:ext uri="{EFAFB233-063F-42B5-8137-9DF3F51BA10A}">
+      <p15:sldGuideLst xmlns:p15="http://schemas.microsoft.com/office/powerpoint/2012/main">
+        <p15:guide id="1" orient="horz" pos="2160">
+          <p15:clr>
+            <a:srgbClr val="A4A3A4"/>
+          </p15:clr>
+        </p15:guide>
+        <p15:guide id="2" pos="2880">
+          <p15:clr>
+            <a:srgbClr val="A4A3A4"/>
+          </p15:clr>
+        </p15:guide>
+      </p15:sldGuideLst>
+    </p:ext>
+  </p:extLst>
 </p:presentation>
 </file>
 
@@ -217,7 +231,7 @@
           <a:p>
             <a:fld id="{5EAE5D59-DEB7-4C06-9B82-FE468E3436AC}" type="datetimeFigureOut">
               <a:rPr lang="pt-BR" smtClean="0"/>
-              <a:t>03/10/2016</a:t>
+              <a:t>04/10/2016</a:t>
             </a:fld>
             <a:endParaRPr lang="pt-BR"/>
           </a:p>
@@ -281,35 +295,35 @@
           <a:p>
             <a:pPr lvl="0"/>
             <a:r>
-              <a:rPr lang="en-US" smtClean="0"/>
+              <a:rPr lang="en-US"/>
               <a:t>Click to edit Master text styles</a:t>
             </a:r>
           </a:p>
           <a:p>
             <a:pPr lvl="1"/>
             <a:r>
-              <a:rPr lang="en-US" smtClean="0"/>
+              <a:rPr lang="en-US"/>
               <a:t>Second level</a:t>
             </a:r>
           </a:p>
           <a:p>
             <a:pPr lvl="2"/>
             <a:r>
-              <a:rPr lang="en-US" smtClean="0"/>
+              <a:rPr lang="en-US"/>
               <a:t>Third level</a:t>
             </a:r>
           </a:p>
           <a:p>
             <a:pPr lvl="3"/>
             <a:r>
-              <a:rPr lang="en-US" smtClean="0"/>
+              <a:rPr lang="en-US"/>
               <a:t>Fourth level</a:t>
             </a:r>
           </a:p>
           <a:p>
             <a:pPr lvl="4"/>
             <a:r>
-              <a:rPr lang="en-US" smtClean="0"/>
+              <a:rPr lang="en-US"/>
               <a:t>Fifth level</a:t>
             </a:r>
             <a:endParaRPr lang="pt-BR"/>
@@ -376,7 +390,7 @@
           <a:p>
             <a:fld id="{7F1823D4-A7F9-4965-9336-D34AFE7C8D9D}" type="slidenum">
               <a:rPr lang="pt-BR" smtClean="0"/>
-              <a:t>‹#›</a:t>
+              <a:t>‹nº›</a:t>
             </a:fld>
             <a:endParaRPr lang="pt-BR"/>
           </a:p>
@@ -784,7 +798,7 @@
           </a:lstStyle>
           <a:p>
             <a:r>
-              <a:rPr lang="en-US" smtClean="0"/>
+              <a:rPr lang="en-US"/>
               <a:t>Click to edit Master title style</a:t>
             </a:r>
             <a:endParaRPr lang="en-US" dirty="0"/>
@@ -905,7 +919,7 @@
           </a:lstStyle>
           <a:p>
             <a:r>
-              <a:rPr lang="en-US" smtClean="0"/>
+              <a:rPr lang="en-US"/>
               <a:t>Click to edit Master subtitle style</a:t>
             </a:r>
             <a:endParaRPr lang="en-US" dirty="0"/>
@@ -929,7 +943,7 @@
           <a:p>
             <a:fld id="{79636FF1-BEC9-487A-B775-042B156D34D5}" type="datetime1">
               <a:rPr lang="pt-BR" smtClean="0"/>
-              <a:t>03/10/2016</a:t>
+              <a:t>04/10/2016</a:t>
             </a:fld>
             <a:endParaRPr lang="pt-BR"/>
           </a:p>
@@ -952,7 +966,7 @@
           <a:p>
             <a:fld id="{79C11AB5-59D3-4802-88F3-6074105E3605}" type="slidenum">
               <a:rPr lang="pt-BR" smtClean="0"/>
-              <a:t>‹#›</a:t>
+              <a:t>‹nº›</a:t>
             </a:fld>
             <a:endParaRPr lang="pt-BR"/>
           </a:p>
@@ -1018,7 +1032,7 @@
           <a:lstStyle/>
           <a:p>
             <a:r>
-              <a:rPr lang="en-US" smtClean="0"/>
+              <a:rPr lang="en-US"/>
               <a:t>Click to edit Master title style</a:t>
             </a:r>
             <a:endParaRPr lang="en-US" dirty="0"/>
@@ -1042,38 +1056,37 @@
           <a:p>
             <a:pPr lvl="0"/>
             <a:r>
-              <a:rPr lang="en-US" smtClean="0"/>
+              <a:rPr lang="en-US"/>
               <a:t>Click to edit Master text styles</a:t>
             </a:r>
           </a:p>
           <a:p>
             <a:pPr lvl="1"/>
             <a:r>
-              <a:rPr lang="en-US" smtClean="0"/>
+              <a:rPr lang="en-US"/>
               <a:t>Second level</a:t>
             </a:r>
           </a:p>
           <a:p>
             <a:pPr lvl="2"/>
             <a:r>
-              <a:rPr lang="en-US" smtClean="0"/>
+              <a:rPr lang="en-US"/>
               <a:t>Third level</a:t>
             </a:r>
           </a:p>
           <a:p>
             <a:pPr lvl="3"/>
             <a:r>
-              <a:rPr lang="en-US" smtClean="0"/>
+              <a:rPr lang="en-US"/>
               <a:t>Fourth level</a:t>
             </a:r>
           </a:p>
           <a:p>
             <a:pPr lvl="4"/>
             <a:r>
-              <a:rPr lang="en-US" smtClean="0"/>
+              <a:rPr lang="en-US"/>
               <a:t>Fifth level</a:t>
             </a:r>
-            <a:endParaRPr lang="en-US"/>
           </a:p>
         </p:txBody>
       </p:sp>
@@ -1094,7 +1107,7 @@
           <a:p>
             <a:fld id="{4D4F39C8-76D4-4882-8E23-7604DAE58838}" type="datetime1">
               <a:rPr lang="pt-BR" smtClean="0"/>
-              <a:t>03/10/2016</a:t>
+              <a:t>04/10/2016</a:t>
             </a:fld>
             <a:endParaRPr lang="pt-BR"/>
           </a:p>
@@ -1136,7 +1149,7 @@
           <a:p>
             <a:fld id="{79C11AB5-59D3-4802-88F3-6074105E3605}" type="slidenum">
               <a:rPr lang="pt-BR" smtClean="0"/>
-              <a:t>‹#›</a:t>
+              <a:t>‹nº›</a:t>
             </a:fld>
             <a:endParaRPr lang="pt-BR"/>
           </a:p>
@@ -1188,7 +1201,7 @@
           <a:lstStyle/>
           <a:p>
             <a:r>
-              <a:rPr lang="en-US" smtClean="0"/>
+              <a:rPr lang="en-US"/>
               <a:t>Click to edit Master title style</a:t>
             </a:r>
             <a:endParaRPr lang="en-US" dirty="0"/>
@@ -1217,38 +1230,37 @@
           <a:p>
             <a:pPr lvl="0"/>
             <a:r>
-              <a:rPr lang="en-US" smtClean="0"/>
+              <a:rPr lang="en-US"/>
               <a:t>Click to edit Master text styles</a:t>
             </a:r>
           </a:p>
           <a:p>
             <a:pPr lvl="1"/>
             <a:r>
-              <a:rPr lang="en-US" smtClean="0"/>
+              <a:rPr lang="en-US"/>
               <a:t>Second level</a:t>
             </a:r>
           </a:p>
           <a:p>
             <a:pPr lvl="2"/>
             <a:r>
-              <a:rPr lang="en-US" smtClean="0"/>
+              <a:rPr lang="en-US"/>
               <a:t>Third level</a:t>
             </a:r>
           </a:p>
           <a:p>
             <a:pPr lvl="3"/>
             <a:r>
-              <a:rPr lang="en-US" smtClean="0"/>
+              <a:rPr lang="en-US"/>
               <a:t>Fourth level</a:t>
             </a:r>
           </a:p>
           <a:p>
             <a:pPr lvl="4"/>
             <a:r>
-              <a:rPr lang="en-US" smtClean="0"/>
+              <a:rPr lang="en-US"/>
               <a:t>Fifth level</a:t>
             </a:r>
-            <a:endParaRPr lang="en-US"/>
           </a:p>
         </p:txBody>
       </p:sp>
@@ -1269,7 +1281,7 @@
           <a:p>
             <a:fld id="{66DCDDB8-31B2-4D9D-9C30-8599D611154C}" type="datetime1">
               <a:rPr lang="pt-BR" smtClean="0"/>
-              <a:t>03/10/2016</a:t>
+              <a:t>04/10/2016</a:t>
             </a:fld>
             <a:endParaRPr lang="pt-BR"/>
           </a:p>
@@ -1311,7 +1323,7 @@
           <a:p>
             <a:fld id="{79C11AB5-59D3-4802-88F3-6074105E3605}" type="slidenum">
               <a:rPr lang="pt-BR" smtClean="0"/>
-              <a:t>‹#›</a:t>
+              <a:t>‹nº›</a:t>
             </a:fld>
             <a:endParaRPr lang="pt-BR"/>
           </a:p>
@@ -1358,7 +1370,7 @@
           <a:lstStyle/>
           <a:p>
             <a:r>
-              <a:rPr lang="en-US" smtClean="0"/>
+              <a:rPr lang="en-US"/>
               <a:t>Click to edit Master title style</a:t>
             </a:r>
             <a:endParaRPr lang="en-US" dirty="0"/>
@@ -1400,38 +1412,38 @@
           <a:p>
             <a:pPr lvl="0"/>
             <a:r>
-              <a:rPr lang="en-US" smtClean="0"/>
+              <a:rPr lang="en-US"/>
               <a:t>Click to edit Master text styles</a:t>
             </a:r>
           </a:p>
           <a:p>
             <a:pPr lvl="1"/>
             <a:r>
-              <a:rPr lang="en-US" smtClean="0"/>
+              <a:rPr lang="en-US"/>
               <a:t>Second level</a:t>
             </a:r>
           </a:p>
           <a:p>
             <a:pPr lvl="2"/>
             <a:r>
-              <a:rPr lang="en-US" smtClean="0"/>
+              <a:rPr lang="en-US"/>
               <a:t>Third level</a:t>
             </a:r>
           </a:p>
           <a:p>
             <a:pPr lvl="3"/>
             <a:r>
-              <a:rPr lang="en-US" smtClean="0"/>
+              <a:rPr lang="en-US"/>
               <a:t>Fourth level</a:t>
             </a:r>
           </a:p>
           <a:p>
             <a:pPr lvl="4"/>
             <a:r>
-              <a:rPr lang="en-US" smtClean="0"/>
+              <a:rPr lang="en-US"/>
               <a:t>Fifth level</a:t>
             </a:r>
-            <a:endParaRPr lang="en-US" dirty="0" smtClean="0"/>
+            <a:endParaRPr lang="en-US" dirty="0"/>
           </a:p>
         </p:txBody>
       </p:sp>
@@ -1452,7 +1464,7 @@
           <a:p>
             <a:fld id="{B831F6D8-D984-4C1A-9594-5FD3828C8CB3}" type="datetime1">
               <a:rPr lang="pt-BR" smtClean="0"/>
-              <a:t>03/10/2016</a:t>
+              <a:t>04/10/2016</a:t>
             </a:fld>
             <a:endParaRPr lang="pt-BR"/>
           </a:p>
@@ -1494,7 +1506,7 @@
           <a:p>
             <a:fld id="{79C11AB5-59D3-4802-88F3-6074105E3605}" type="slidenum">
               <a:rPr lang="pt-BR" smtClean="0"/>
-              <a:t>‹#›</a:t>
+              <a:t>‹nº›</a:t>
             </a:fld>
             <a:endParaRPr lang="pt-BR"/>
           </a:p>
@@ -1571,7 +1583,7 @@
           </a:lstStyle>
           <a:p>
             <a:r>
-              <a:rPr lang="en-US" smtClean="0"/>
+              <a:rPr lang="en-US"/>
               <a:t>Click to edit Master title style</a:t>
             </a:r>
             <a:endParaRPr lang="en-US" dirty="0"/>
@@ -1691,7 +1703,7 @@
           <a:p>
             <a:pPr lvl="0"/>
             <a:r>
-              <a:rPr lang="en-US" smtClean="0"/>
+              <a:rPr lang="en-US"/>
               <a:t>Click to edit Master text styles</a:t>
             </a:r>
           </a:p>
@@ -1714,7 +1726,7 @@
           <a:p>
             <a:fld id="{21FD1799-EBAA-4B81-9BF3-7249118F97B5}" type="datetime1">
               <a:rPr lang="pt-BR" smtClean="0"/>
-              <a:t>03/10/2016</a:t>
+              <a:t>04/10/2016</a:t>
             </a:fld>
             <a:endParaRPr lang="pt-BR"/>
           </a:p>
@@ -1756,7 +1768,7 @@
           <a:p>
             <a:fld id="{79C11AB5-59D3-4802-88F3-6074105E3605}" type="slidenum">
               <a:rPr lang="pt-BR" smtClean="0"/>
-              <a:t>‹#›</a:t>
+              <a:t>‹nº›</a:t>
             </a:fld>
             <a:endParaRPr lang="pt-BR"/>
           </a:p>
@@ -1953,10 +1965,9 @@
           <a:lstStyle/>
           <a:p>
             <a:r>
-              <a:rPr lang="en-US" smtClean="0"/>
+              <a:rPr lang="en-US"/>
               <a:t>Click to edit Master title style</a:t>
             </a:r>
-            <a:endParaRPr lang="en-US"/>
           </a:p>
         </p:txBody>
       </p:sp>
@@ -2010,38 +2021,38 @@
           <a:p>
             <a:pPr lvl="0"/>
             <a:r>
-              <a:rPr lang="en-US" smtClean="0"/>
+              <a:rPr lang="en-US"/>
               <a:t>Click to edit Master text styles</a:t>
             </a:r>
           </a:p>
           <a:p>
             <a:pPr lvl="1"/>
             <a:r>
-              <a:rPr lang="en-US" smtClean="0"/>
+              <a:rPr lang="en-US"/>
               <a:t>Second level</a:t>
             </a:r>
           </a:p>
           <a:p>
             <a:pPr lvl="2"/>
             <a:r>
-              <a:rPr lang="en-US" smtClean="0"/>
+              <a:rPr lang="en-US"/>
               <a:t>Third level</a:t>
             </a:r>
           </a:p>
           <a:p>
             <a:pPr lvl="3"/>
             <a:r>
-              <a:rPr lang="en-US" smtClean="0"/>
+              <a:rPr lang="en-US"/>
               <a:t>Fourth level</a:t>
             </a:r>
           </a:p>
           <a:p>
             <a:pPr lvl="4"/>
             <a:r>
-              <a:rPr lang="en-US" smtClean="0"/>
+              <a:rPr lang="en-US"/>
               <a:t>Fifth level</a:t>
             </a:r>
-            <a:endParaRPr lang="en-US" dirty="0" smtClean="0"/>
+            <a:endParaRPr lang="en-US" dirty="0"/>
           </a:p>
         </p:txBody>
       </p:sp>
@@ -2062,7 +2073,7 @@
           <a:p>
             <a:fld id="{320F8C22-410E-4AED-B0FB-B8325900C0ED}" type="datetime1">
               <a:rPr lang="pt-BR" smtClean="0"/>
-              <a:t>03/10/2016</a:t>
+              <a:t>04/10/2016</a:t>
             </a:fld>
             <a:endParaRPr lang="pt-BR"/>
           </a:p>
@@ -2104,7 +2115,7 @@
           <a:p>
             <a:fld id="{79C11AB5-59D3-4802-88F3-6074105E3605}" type="slidenum">
               <a:rPr lang="pt-BR" smtClean="0"/>
-              <a:t>‹#›</a:t>
+              <a:t>‹nº›</a:t>
             </a:fld>
             <a:endParaRPr lang="pt-BR"/>
           </a:p>
@@ -2132,38 +2143,37 @@
           <a:p>
             <a:pPr lvl="0"/>
             <a:r>
-              <a:rPr lang="en-US" smtClean="0"/>
+              <a:rPr lang="en-US"/>
               <a:t>Click to edit Master text styles</a:t>
             </a:r>
           </a:p>
           <a:p>
             <a:pPr lvl="1"/>
             <a:r>
-              <a:rPr lang="en-US" smtClean="0"/>
+              <a:rPr lang="en-US"/>
               <a:t>Second level</a:t>
             </a:r>
           </a:p>
           <a:p>
             <a:pPr lvl="2"/>
             <a:r>
-              <a:rPr lang="en-US" smtClean="0"/>
+              <a:rPr lang="en-US"/>
               <a:t>Third level</a:t>
             </a:r>
           </a:p>
           <a:p>
             <a:pPr lvl="3"/>
             <a:r>
-              <a:rPr lang="en-US" smtClean="0"/>
+              <a:rPr lang="en-US"/>
               <a:t>Fourth level</a:t>
             </a:r>
           </a:p>
           <a:p>
             <a:pPr lvl="4"/>
             <a:r>
-              <a:rPr lang="en-US" smtClean="0"/>
+              <a:rPr lang="en-US"/>
               <a:t>Fifth level</a:t>
             </a:r>
-            <a:endParaRPr lang="en-US"/>
           </a:p>
         </p:txBody>
       </p:sp>
@@ -2212,10 +2222,9 @@
           </a:lstStyle>
           <a:p>
             <a:r>
-              <a:rPr lang="en-US" smtClean="0"/>
+              <a:rPr lang="en-US"/>
               <a:t>Click to edit Master title style</a:t>
             </a:r>
-            <a:endParaRPr lang="en-US"/>
           </a:p>
         </p:txBody>
       </p:sp>
@@ -2280,7 +2289,7 @@
           <a:p>
             <a:pPr lvl="0"/>
             <a:r>
-              <a:rPr lang="en-US" smtClean="0"/>
+              <a:rPr lang="en-US"/>
               <a:t>Click to edit Master text styles</a:t>
             </a:r>
           </a:p>
@@ -2347,7 +2356,7 @@
           <a:p>
             <a:pPr lvl="0"/>
             <a:r>
-              <a:rPr lang="en-US" smtClean="0"/>
+              <a:rPr lang="en-US"/>
               <a:t>Click to edit Master text styles</a:t>
             </a:r>
           </a:p>
@@ -2370,7 +2379,7 @@
           <a:p>
             <a:fld id="{88F7B033-E326-4886-BEC2-44D676596F39}" type="datetime1">
               <a:rPr lang="pt-BR" smtClean="0"/>
-              <a:t>03/10/2016</a:t>
+              <a:t>04/10/2016</a:t>
             </a:fld>
             <a:endParaRPr lang="pt-BR"/>
           </a:p>
@@ -2412,7 +2421,7 @@
           <a:p>
             <a:fld id="{79C11AB5-59D3-4802-88F3-6074105E3605}" type="slidenum">
               <a:rPr lang="pt-BR" smtClean="0"/>
-              <a:t>‹#›</a:t>
+              <a:t>‹nº›</a:t>
             </a:fld>
             <a:endParaRPr lang="pt-BR"/>
           </a:p>
@@ -2440,35 +2449,35 @@
           <a:p>
             <a:pPr lvl="0"/>
             <a:r>
-              <a:rPr lang="en-US" smtClean="0"/>
+              <a:rPr lang="en-US"/>
               <a:t>Click to edit Master text styles</a:t>
             </a:r>
           </a:p>
           <a:p>
             <a:pPr lvl="1"/>
             <a:r>
-              <a:rPr lang="en-US" smtClean="0"/>
+              <a:rPr lang="en-US"/>
               <a:t>Second level</a:t>
             </a:r>
           </a:p>
           <a:p>
             <a:pPr lvl="2"/>
             <a:r>
-              <a:rPr lang="en-US" smtClean="0"/>
+              <a:rPr lang="en-US"/>
               <a:t>Third level</a:t>
             </a:r>
           </a:p>
           <a:p>
             <a:pPr lvl="3"/>
             <a:r>
-              <a:rPr lang="en-US" smtClean="0"/>
+              <a:rPr lang="en-US"/>
               <a:t>Fourth level</a:t>
             </a:r>
           </a:p>
           <a:p>
             <a:pPr lvl="4"/>
             <a:r>
-              <a:rPr lang="en-US" smtClean="0"/>
+              <a:rPr lang="en-US"/>
               <a:t>Fifth level</a:t>
             </a:r>
             <a:endParaRPr lang="en-US" dirty="0"/>
@@ -2497,35 +2506,35 @@
           <a:p>
             <a:pPr lvl="0"/>
             <a:r>
-              <a:rPr lang="en-US" smtClean="0"/>
+              <a:rPr lang="en-US"/>
               <a:t>Click to edit Master text styles</a:t>
             </a:r>
           </a:p>
           <a:p>
             <a:pPr lvl="1"/>
             <a:r>
-              <a:rPr lang="en-US" smtClean="0"/>
+              <a:rPr lang="en-US"/>
               <a:t>Second level</a:t>
             </a:r>
           </a:p>
           <a:p>
             <a:pPr lvl="2"/>
             <a:r>
-              <a:rPr lang="en-US" smtClean="0"/>
+              <a:rPr lang="en-US"/>
               <a:t>Third level</a:t>
             </a:r>
           </a:p>
           <a:p>
             <a:pPr lvl="3"/>
             <a:r>
-              <a:rPr lang="en-US" smtClean="0"/>
+              <a:rPr lang="en-US"/>
               <a:t>Fourth level</a:t>
             </a:r>
           </a:p>
           <a:p>
             <a:pPr lvl="4"/>
             <a:r>
-              <a:rPr lang="en-US" smtClean="0"/>
+              <a:rPr lang="en-US"/>
               <a:t>Fifth level</a:t>
             </a:r>
             <a:endParaRPr lang="en-US" dirty="0"/>
@@ -2573,7 +2582,7 @@
           <a:lstStyle/>
           <a:p>
             <a:r>
-              <a:rPr lang="en-US" smtClean="0"/>
+              <a:rPr lang="en-US"/>
               <a:t>Click to edit Master title style</a:t>
             </a:r>
             <a:endParaRPr lang="en-US" dirty="0"/>
@@ -2597,7 +2606,7 @@
           <a:p>
             <a:fld id="{C24C3F87-6B6D-4178-A079-326162BC0D3D}" type="datetime1">
               <a:rPr lang="pt-BR" smtClean="0"/>
-              <a:t>03/10/2016</a:t>
+              <a:t>04/10/2016</a:t>
             </a:fld>
             <a:endParaRPr lang="pt-BR"/>
           </a:p>
@@ -2639,7 +2648,7 @@
           <a:p>
             <a:fld id="{79C11AB5-59D3-4802-88F3-6074105E3605}" type="slidenum">
               <a:rPr lang="pt-BR" smtClean="0"/>
-              <a:t>‹#›</a:t>
+              <a:t>‹nº›</a:t>
             </a:fld>
             <a:endParaRPr lang="pt-BR"/>
           </a:p>
@@ -2687,7 +2696,7 @@
           <a:p>
             <a:fld id="{5240E660-74C4-49E4-8270-F03270183E0B}" type="datetime1">
               <a:rPr lang="pt-BR" smtClean="0"/>
-              <a:t>03/10/2016</a:t>
+              <a:t>04/10/2016</a:t>
             </a:fld>
             <a:endParaRPr lang="pt-BR"/>
           </a:p>
@@ -2729,7 +2738,7 @@
           <a:p>
             <a:fld id="{79C11AB5-59D3-4802-88F3-6074105E3605}" type="slidenum">
               <a:rPr lang="pt-BR" smtClean="0"/>
-              <a:t>‹#›</a:t>
+              <a:t>‹nº›</a:t>
             </a:fld>
             <a:endParaRPr lang="pt-BR"/>
           </a:p>
@@ -2796,7 +2805,7 @@
           </a:lstStyle>
           <a:p>
             <a:r>
-              <a:rPr lang="en-US" smtClean="0"/>
+              <a:rPr lang="en-US"/>
               <a:t>Click to edit Master title style</a:t>
             </a:r>
             <a:endParaRPr lang="en-US" dirty="0"/>
@@ -2853,35 +2862,35 @@
           <a:p>
             <a:pPr lvl="0"/>
             <a:r>
-              <a:rPr lang="en-US" smtClean="0"/>
+              <a:rPr lang="en-US"/>
               <a:t>Click to edit Master text styles</a:t>
             </a:r>
           </a:p>
           <a:p>
             <a:pPr lvl="1"/>
             <a:r>
-              <a:rPr lang="en-US" smtClean="0"/>
+              <a:rPr lang="en-US"/>
               <a:t>Second level</a:t>
             </a:r>
           </a:p>
           <a:p>
             <a:pPr lvl="2"/>
             <a:r>
-              <a:rPr lang="en-US" smtClean="0"/>
+              <a:rPr lang="en-US"/>
               <a:t>Third level</a:t>
             </a:r>
           </a:p>
           <a:p>
             <a:pPr lvl="3"/>
             <a:r>
-              <a:rPr lang="en-US" smtClean="0"/>
+              <a:rPr lang="en-US"/>
               <a:t>Fourth level</a:t>
             </a:r>
           </a:p>
           <a:p>
             <a:pPr lvl="4"/>
             <a:r>
-              <a:rPr lang="en-US" smtClean="0"/>
+              <a:rPr lang="en-US"/>
               <a:t>Fifth level</a:t>
             </a:r>
             <a:endParaRPr lang="en-US" dirty="0"/>
@@ -2952,7 +2961,7 @@
           <a:p>
             <a:pPr lvl="0"/>
             <a:r>
-              <a:rPr lang="en-US" smtClean="0"/>
+              <a:rPr lang="en-US"/>
               <a:t>Click to edit Master text styles</a:t>
             </a:r>
           </a:p>
@@ -2975,7 +2984,7 @@
           <a:p>
             <a:fld id="{B819A53A-9F85-42D0-B9CC-184D78EA8994}" type="datetime1">
               <a:rPr lang="pt-BR" smtClean="0"/>
-              <a:t>03/10/2016</a:t>
+              <a:t>04/10/2016</a:t>
             </a:fld>
             <a:endParaRPr lang="pt-BR"/>
           </a:p>
@@ -3017,7 +3026,7 @@
           <a:p>
             <a:fld id="{79C11AB5-59D3-4802-88F3-6074105E3605}" type="slidenum">
               <a:rPr lang="pt-BR" smtClean="0"/>
-              <a:t>‹#›</a:t>
+              <a:t>‹nº›</a:t>
             </a:fld>
             <a:endParaRPr lang="pt-BR"/>
           </a:p>
@@ -3076,7 +3085,7 @@
           </a:lstStyle>
           <a:p>
             <a:r>
-              <a:rPr lang="en-US" smtClean="0"/>
+              <a:rPr lang="en-US"/>
               <a:t>Click to edit Master title style</a:t>
             </a:r>
             <a:endParaRPr lang="en-US" dirty="0"/>
@@ -3153,7 +3162,7 @@
           </a:lstStyle>
           <a:p>
             <a:r>
-              <a:rPr lang="en-US" smtClean="0"/>
+              <a:rPr lang="en-US"/>
               <a:t>Click icon to add picture</a:t>
             </a:r>
             <a:endParaRPr lang="en-US" dirty="0"/>
@@ -3221,7 +3230,7 @@
           <a:p>
             <a:pPr lvl="0"/>
             <a:r>
-              <a:rPr lang="en-US" smtClean="0"/>
+              <a:rPr lang="en-US"/>
               <a:t>Click to edit Master text styles</a:t>
             </a:r>
           </a:p>
@@ -3244,7 +3253,7 @@
           <a:p>
             <a:fld id="{F86587FA-85D0-48B3-9427-F7A663A55E2C}" type="datetime1">
               <a:rPr lang="pt-BR" smtClean="0"/>
-              <a:t>03/10/2016</a:t>
+              <a:t>04/10/2016</a:t>
             </a:fld>
             <a:endParaRPr lang="pt-BR"/>
           </a:p>
@@ -3286,7 +3295,7 @@
           <a:p>
             <a:fld id="{79C11AB5-59D3-4802-88F3-6074105E3605}" type="slidenum">
               <a:rPr lang="pt-BR" smtClean="0"/>
-              <a:t>‹#›</a:t>
+              <a:t>‹nº›</a:t>
             </a:fld>
             <a:endParaRPr lang="pt-BR"/>
           </a:p>
@@ -3348,7 +3357,7 @@
           <a:lstStyle/>
           <a:p>
             <a:r>
-              <a:rPr lang="en-US" smtClean="0"/>
+              <a:rPr lang="en-US"/>
               <a:t>Click to edit Master title style</a:t>
             </a:r>
             <a:endParaRPr lang="en-US" dirty="0"/>
@@ -3382,38 +3391,38 @@
           <a:p>
             <a:pPr lvl="0"/>
             <a:r>
-              <a:rPr lang="en-US" smtClean="0"/>
+              <a:rPr lang="en-US"/>
               <a:t>Click to edit Master text styles</a:t>
             </a:r>
           </a:p>
           <a:p>
             <a:pPr lvl="1"/>
             <a:r>
-              <a:rPr lang="en-US" smtClean="0"/>
+              <a:rPr lang="en-US"/>
               <a:t>Second level</a:t>
             </a:r>
           </a:p>
           <a:p>
             <a:pPr lvl="2"/>
             <a:r>
-              <a:rPr lang="en-US" smtClean="0"/>
+              <a:rPr lang="en-US"/>
               <a:t>Third level</a:t>
             </a:r>
           </a:p>
           <a:p>
             <a:pPr lvl="3"/>
             <a:r>
-              <a:rPr lang="en-US" smtClean="0"/>
+              <a:rPr lang="en-US"/>
               <a:t>Fourth level</a:t>
             </a:r>
           </a:p>
           <a:p>
             <a:pPr lvl="4"/>
             <a:r>
-              <a:rPr lang="en-US" smtClean="0"/>
+              <a:rPr lang="en-US"/>
               <a:t>Fifth level</a:t>
             </a:r>
-            <a:endParaRPr lang="en-US" dirty="0" smtClean="0"/>
+            <a:endParaRPr lang="en-US" dirty="0"/>
           </a:p>
         </p:txBody>
       </p:sp>
@@ -3454,7 +3463,7 @@
           <a:p>
             <a:fld id="{88901E99-FA2C-464D-B276-A97EC5DB96AD}" type="datetime1">
               <a:rPr lang="pt-BR" smtClean="0"/>
-              <a:t>03/10/2016</a:t>
+              <a:t>04/10/2016</a:t>
             </a:fld>
             <a:endParaRPr lang="pt-BR"/>
           </a:p>
@@ -3536,7 +3545,7 @@
           <a:p>
             <a:fld id="{79C11AB5-59D3-4802-88F3-6074105E3605}" type="slidenum">
               <a:rPr lang="pt-BR" smtClean="0"/>
-              <a:t>‹#›</a:t>
+              <a:t>‹nº›</a:t>
             </a:fld>
             <a:endParaRPr lang="pt-BR"/>
           </a:p>
@@ -4002,21 +4011,8 @@
                   <a:schemeClr val="bg1"/>
                 </a:solidFill>
               </a:rPr>
-              <a:t>Algoritmos genéticos aplicados em busca heuristica de caminho para otimização de </a:t>
-            </a:r>
-            <a:r>
-              <a:rPr lang="pt-BR" sz="4800" dirty="0" smtClean="0">
-                <a:solidFill>
-                  <a:schemeClr val="bg1"/>
-                </a:solidFill>
-              </a:rPr>
-              <a:t>espaço</a:t>
-            </a:r>
-            <a:endParaRPr lang="pt-BR" sz="4800" dirty="0">
-              <a:solidFill>
-                <a:schemeClr val="bg1"/>
-              </a:solidFill>
-            </a:endParaRPr>
+              <a:t>Algoritmos genéticos aplicados em busca heuristica de caminho para otimização de espaço</a:t>
+            </a:r>
           </a:p>
         </p:txBody>
       </p:sp>
@@ -4083,7 +4079,7 @@
           <a:lstStyle/>
           <a:p>
             <a:r>
-              <a:rPr lang="pt-BR" sz="2400" dirty="0" smtClean="0">
+              <a:rPr lang="pt-BR" sz="2400" dirty="0">
                 <a:solidFill>
                   <a:schemeClr val="tx1"/>
                 </a:solidFill>
@@ -4093,7 +4089,7 @@
           </a:p>
           <a:p>
             <a:r>
-              <a:rPr lang="pt-BR" sz="2400" dirty="0" smtClean="0">
+              <a:rPr lang="pt-BR" sz="2400" dirty="0">
                 <a:solidFill>
                   <a:schemeClr val="tx1"/>
                 </a:solidFill>
@@ -4101,7 +4097,7 @@
               <a:t>Lucas </a:t>
             </a:r>
             <a:r>
-              <a:rPr lang="pt-BR" sz="2400" dirty="0" smtClean="0">
+              <a:rPr lang="pt-BR" sz="2400" dirty="0">
                 <a:solidFill>
                   <a:schemeClr val="tx1"/>
                 </a:solidFill>
@@ -4111,18 +4107,13 @@
               <a:t>Teles</a:t>
             </a:r>
             <a:r>
-              <a:rPr lang="pt-BR" sz="2400" dirty="0" smtClean="0">
+              <a:rPr lang="pt-BR" sz="2400" dirty="0">
                 <a:solidFill>
                   <a:schemeClr val="tx1"/>
                 </a:solidFill>
               </a:rPr>
               <a:t> Agostinho</a:t>
             </a:r>
-            <a:endParaRPr lang="pt-BR" sz="2400" dirty="0" smtClean="0">
-              <a:solidFill>
-                <a:schemeClr val="tx1"/>
-              </a:solidFill>
-            </a:endParaRPr>
           </a:p>
         </p:txBody>
       </p:sp>
@@ -4148,7 +4139,7 @@
           <a:lstStyle/>
           <a:p>
             <a:r>
-              <a:rPr lang="pt-BR" sz="2400" dirty="0" smtClean="0">
+              <a:rPr lang="pt-BR" sz="2400" dirty="0">
                 <a:solidFill>
                   <a:schemeClr val="tx1"/>
                 </a:solidFill>
@@ -4158,7 +4149,7 @@
           </a:p>
           <a:p>
             <a:r>
-              <a:rPr lang="pt-BR" sz="2400" dirty="0" smtClean="0">
+              <a:rPr lang="pt-BR" sz="2400" dirty="0">
                 <a:solidFill>
                   <a:schemeClr val="tx1"/>
                 </a:solidFill>
@@ -4168,18 +4159,13 @@
               <a:t>Professor</a:t>
             </a:r>
             <a:r>
-              <a:rPr lang="pt-BR" sz="2400" dirty="0" smtClean="0">
+              <a:rPr lang="pt-BR" sz="2400" dirty="0">
                 <a:solidFill>
                   <a:schemeClr val="tx1"/>
                 </a:solidFill>
               </a:rPr>
               <a:t> Dr. Eduardo Heredia</a:t>
             </a:r>
-            <a:endParaRPr lang="pt-BR" sz="2400" dirty="0" smtClean="0">
-              <a:solidFill>
-                <a:schemeClr val="tx1"/>
-              </a:solidFill>
-            </a:endParaRPr>
           </a:p>
         </p:txBody>
       </p:sp>
@@ -4205,7 +4191,7 @@
           <a:lstStyle/>
           <a:p>
             <a:r>
-              <a:rPr lang="pt-BR" sz="2600" i="1" dirty="0" smtClean="0">
+              <a:rPr lang="pt-BR" sz="2600" i="1" dirty="0">
                 <a:solidFill>
                   <a:schemeClr val="tx1"/>
                 </a:solidFill>
@@ -4214,13 +4200,6 @@
               </a:rPr>
               <a:t>Centro Universitario Senac</a:t>
             </a:r>
-            <a:endParaRPr lang="pt-BR" sz="2600" i="1" dirty="0" smtClean="0">
-              <a:solidFill>
-                <a:schemeClr val="tx1"/>
-              </a:solidFill>
-              <a:latin typeface="Times New Roman" panose="02020603050405020304" pitchFamily="18" charset="0"/>
-              <a:cs typeface="Times New Roman" panose="02020603050405020304" pitchFamily="18" charset="0"/>
-            </a:endParaRPr>
           </a:p>
         </p:txBody>
       </p:sp>
@@ -4234,13 +4213,6 @@
   <p:clrMapOvr>
     <a:masterClrMapping/>
   </p:clrMapOvr>
-  <p:timing>
-    <p:tnLst>
-      <p:par>
-        <p:cTn id="1" dur="indefinite" restart="never" nodeType="tmRoot"/>
-      </p:par>
-    </p:tnLst>
-  </p:timing>
 </p:sld>
 </file>
 
@@ -4283,13 +4255,8 @@
           <a:p>
             <a:r>
               <a:rPr lang="pt-BR" dirty="0"/>
-              <a:t>Algoritmo A</a:t>
-            </a:r>
-            <a:r>
-              <a:rPr lang="pt-BR" dirty="0" smtClean="0"/>
-              <a:t>* e BFS</a:t>
-            </a:r>
-            <a:endParaRPr lang="pt-BR" dirty="0"/>
+              <a:t>Algoritmo A* e BFS</a:t>
+            </a:r>
           </a:p>
         </p:txBody>
       </p:sp>
@@ -4704,13 +4671,6 @@
   <p:clrMapOvr>
     <a:masterClrMapping/>
   </p:clrMapOvr>
-  <p:timing>
-    <p:tnLst>
-      <p:par>
-        <p:cTn id="1" dur="indefinite" restart="never" nodeType="tmRoot"/>
-      </p:par>
-    </p:tnLst>
-  </p:timing>
 </p:sld>
 </file>
 
@@ -4753,13 +4713,8 @@
           <a:p>
             <a:r>
               <a:rPr lang="pt-BR" dirty="0"/>
-              <a:t>Algoritmo A</a:t>
-            </a:r>
-            <a:r>
-              <a:rPr lang="pt-BR" dirty="0" smtClean="0"/>
-              <a:t>* e BFS</a:t>
-            </a:r>
-            <a:endParaRPr lang="pt-BR" dirty="0"/>
+              <a:t>Algoritmo A* e BFS</a:t>
+            </a:r>
           </a:p>
         </p:txBody>
       </p:sp>
@@ -5172,13 +5127,6 @@
   <p:clrMapOvr>
     <a:masterClrMapping/>
   </p:clrMapOvr>
-  <p:timing>
-    <p:tnLst>
-      <p:par>
-        <p:cTn id="1" dur="indefinite" restart="never" nodeType="tmRoot"/>
-      </p:par>
-    </p:tnLst>
-  </p:timing>
 </p:sld>
 </file>
 
@@ -5221,13 +5169,8 @@
           <a:p>
             <a:r>
               <a:rPr lang="pt-BR" dirty="0"/>
-              <a:t>Algoritmo A</a:t>
-            </a:r>
-            <a:r>
-              <a:rPr lang="pt-BR" dirty="0" smtClean="0"/>
-              <a:t>* e BFS</a:t>
-            </a:r>
-            <a:endParaRPr lang="pt-BR" dirty="0"/>
+              <a:t>Algoritmo A* e BFS</a:t>
+            </a:r>
           </a:p>
         </p:txBody>
       </p:sp>
@@ -5588,13 +5531,6 @@
   <p:clrMapOvr>
     <a:masterClrMapping/>
   </p:clrMapOvr>
-  <p:timing>
-    <p:tnLst>
-      <p:par>
-        <p:cTn id="1" dur="indefinite" restart="never" nodeType="tmRoot"/>
-      </p:par>
-    </p:tnLst>
-  </p:timing>
 </p:sld>
 </file>
 
@@ -5637,13 +5573,8 @@
           <a:p>
             <a:r>
               <a:rPr lang="pt-BR" dirty="0"/>
-              <a:t>Algoritmo A</a:t>
-            </a:r>
-            <a:r>
-              <a:rPr lang="pt-BR" dirty="0" smtClean="0"/>
-              <a:t>* e BFS</a:t>
-            </a:r>
-            <a:endParaRPr lang="pt-BR" dirty="0"/>
+              <a:t>Algoritmo A* e BFS</a:t>
+            </a:r>
           </a:p>
         </p:txBody>
       </p:sp>
@@ -5896,13 +5827,6 @@
   <p:clrMapOvr>
     <a:masterClrMapping/>
   </p:clrMapOvr>
-  <p:timing>
-    <p:tnLst>
-      <p:par>
-        <p:cTn id="1" dur="indefinite" restart="never" nodeType="tmRoot"/>
-      </p:par>
-    </p:tnLst>
-  </p:timing>
 </p:sld>
 </file>
 
@@ -5945,13 +5869,8 @@
           <a:p>
             <a:r>
               <a:rPr lang="pt-BR" dirty="0"/>
-              <a:t>Algoritmo A</a:t>
-            </a:r>
-            <a:r>
-              <a:rPr lang="pt-BR" dirty="0" smtClean="0"/>
-              <a:t>* e BFS</a:t>
-            </a:r>
-            <a:endParaRPr lang="pt-BR" dirty="0"/>
+              <a:t>Algoritmo A* e BFS</a:t>
+            </a:r>
           </a:p>
         </p:txBody>
       </p:sp>
@@ -6150,13 +6069,6 @@
   <p:clrMapOvr>
     <a:masterClrMapping/>
   </p:clrMapOvr>
-  <p:timing>
-    <p:tnLst>
-      <p:par>
-        <p:cTn id="1" dur="indefinite" restart="never" nodeType="tmRoot"/>
-      </p:par>
-    </p:tnLst>
-  </p:timing>
 </p:sld>
 </file>
 
@@ -6199,13 +6111,8 @@
           <a:p>
             <a:r>
               <a:rPr lang="pt-BR" dirty="0"/>
-              <a:t>Algoritmo A</a:t>
-            </a:r>
-            <a:r>
-              <a:rPr lang="pt-BR" dirty="0" smtClean="0"/>
-              <a:t>* e BFS</a:t>
-            </a:r>
-            <a:endParaRPr lang="pt-BR" dirty="0"/>
+              <a:t>Algoritmo A* e BFS</a:t>
+            </a:r>
           </a:p>
         </p:txBody>
       </p:sp>
@@ -6350,13 +6257,6 @@
   <p:clrMapOvr>
     <a:masterClrMapping/>
   </p:clrMapOvr>
-  <p:timing>
-    <p:tnLst>
-      <p:par>
-        <p:cTn id="1" dur="indefinite" restart="never" nodeType="tmRoot"/>
-      </p:par>
-    </p:tnLst>
-  </p:timing>
 </p:sld>
 </file>
 
@@ -6399,13 +6299,8 @@
           <a:p>
             <a:r>
               <a:rPr lang="pt-BR" dirty="0"/>
-              <a:t>Algoritmo A</a:t>
-            </a:r>
-            <a:r>
-              <a:rPr lang="pt-BR" dirty="0" smtClean="0"/>
-              <a:t>* e BFS</a:t>
-            </a:r>
-            <a:endParaRPr lang="pt-BR" dirty="0"/>
+              <a:t>Algoritmo A* e BFS</a:t>
+            </a:r>
           </a:p>
         </p:txBody>
       </p:sp>
@@ -6496,13 +6391,6 @@
   <p:clrMapOvr>
     <a:masterClrMapping/>
   </p:clrMapOvr>
-  <p:timing>
-    <p:tnLst>
-      <p:par>
-        <p:cTn id="1" dur="indefinite" restart="never" nodeType="tmRoot"/>
-      </p:par>
-    </p:tnLst>
-  </p:timing>
 </p:sld>
 </file>
 
@@ -6544,10 +6432,9 @@
           <a:lstStyle/>
           <a:p>
             <a:r>
-              <a:rPr lang="pt-BR" dirty="0" smtClean="0"/>
+              <a:rPr lang="pt-BR" dirty="0"/>
               <a:t>O problema A* e BFS</a:t>
             </a:r>
-            <a:endParaRPr lang="pt-BR" dirty="0"/>
           </a:p>
         </p:txBody>
       </p:sp>
@@ -6597,13 +6484,8 @@
           <a:p>
             <a:r>
               <a:rPr lang="pt-BR" dirty="0"/>
-              <a:t>C</a:t>
-            </a:r>
-            <a:r>
-              <a:rPr lang="pt-BR" dirty="0" smtClean="0"/>
-              <a:t>omplexidade espacial (consumo de memória)</a:t>
-            </a:r>
-            <a:endParaRPr lang="pt-BR" dirty="0"/>
+              <a:t>Complexidade espacial (consumo de memória)</a:t>
+            </a:r>
           </a:p>
         </p:txBody>
       </p:sp>
@@ -6725,13 +6607,6 @@
   <p:clrMapOvr>
     <a:masterClrMapping/>
   </p:clrMapOvr>
-  <p:timing>
-    <p:tnLst>
-      <p:par>
-        <p:cTn id="1" dur="indefinite" restart="never" nodeType="tmRoot"/>
-      </p:par>
-    </p:tnLst>
-  </p:timing>
 </p:sld>
 </file>
 
@@ -6858,14 +6733,14 @@
               <a:buChar char="•"/>
             </a:pPr>
             <a:r>
-              <a:rPr lang="pt-BR" dirty="0" smtClean="0"/>
+              <a:rPr lang="pt-BR" dirty="0"/>
               <a:t>O que </a:t>
             </a:r>
             <a:r>
-              <a:rPr lang="en-US" dirty="0" smtClean="0"/>
+              <a:rPr lang="en-US" dirty="0"/>
               <a:t>é?</a:t>
             </a:r>
-            <a:endParaRPr lang="pt-BR" dirty="0" smtClean="0"/>
+            <a:endParaRPr lang="pt-BR" dirty="0"/>
           </a:p>
           <a:p>
             <a:pPr marL="285750" indent="-285750">
@@ -6873,10 +6748,9 @@
               <a:buChar char="•"/>
             </a:pPr>
             <a:r>
-              <a:rPr lang="pt-BR" dirty="0" smtClean="0"/>
+              <a:rPr lang="pt-BR" dirty="0"/>
               <a:t>Como ele funciona? </a:t>
             </a:r>
-            <a:endParaRPr lang="pt-BR" dirty="0" smtClean="0"/>
           </a:p>
         </p:txBody>
       </p:sp>
@@ -6972,13 +6846,6 @@
   <p:clrMapOvr>
     <a:masterClrMapping/>
   </p:clrMapOvr>
-  <p:timing>
-    <p:tnLst>
-      <p:par>
-        <p:cTn id="1" dur="indefinite" restart="never" nodeType="tmRoot"/>
-      </p:par>
-    </p:tnLst>
-  </p:timing>
 </p:sld>
 </file>
 
@@ -7020,10 +6887,9 @@
           <a:lstStyle/>
           <a:p>
             <a:r>
-              <a:rPr lang="pt-BR" dirty="0" smtClean="0"/>
+              <a:rPr lang="pt-BR" dirty="0"/>
               <a:t>Algoritimo PPGA</a:t>
             </a:r>
-            <a:endParaRPr lang="pt-BR" dirty="0"/>
           </a:p>
         </p:txBody>
       </p:sp>
@@ -7181,22 +7047,21 @@
           <a:p>
             <a:pPr algn="ctr"/>
             <a:r>
-              <a:rPr lang="pt-BR" dirty="0" smtClean="0"/>
+              <a:rPr lang="pt-BR" dirty="0"/>
               <a:t>O que </a:t>
             </a:r>
             <a:r>
-              <a:rPr lang="en-US" dirty="0" smtClean="0"/>
+              <a:rPr lang="en-US" dirty="0"/>
               <a:t>é?</a:t>
             </a:r>
-            <a:endParaRPr lang="pt-BR" dirty="0" smtClean="0"/>
+            <a:endParaRPr lang="pt-BR" dirty="0"/>
           </a:p>
           <a:p>
             <a:pPr algn="ctr"/>
             <a:r>
-              <a:rPr lang="pt-BR" dirty="0" smtClean="0"/>
+              <a:rPr lang="pt-BR" dirty="0"/>
               <a:t>Como ele funciona? </a:t>
             </a:r>
-            <a:endParaRPr lang="pt-BR" dirty="0" smtClean="0"/>
           </a:p>
         </p:txBody>
       </p:sp>
@@ -7250,13 +7115,6 @@
   <p:clrMapOvr>
     <a:masterClrMapping/>
   </p:clrMapOvr>
-  <p:timing>
-    <p:tnLst>
-      <p:par>
-        <p:cTn id="1" dur="indefinite" restart="never" nodeType="tmRoot"/>
-      </p:par>
-    </p:tnLst>
-  </p:timing>
 </p:sld>
 </file>
 
@@ -7298,10 +7156,9 @@
           <a:lstStyle/>
           <a:p>
             <a:r>
-              <a:rPr lang="pt-BR" dirty="0" smtClean="0"/>
+              <a:rPr lang="pt-BR" dirty="0"/>
               <a:t>Indice</a:t>
             </a:r>
-            <a:endParaRPr lang="pt-BR" dirty="0"/>
           </a:p>
         </p:txBody>
       </p:sp>
@@ -7326,7 +7183,7 @@
           <a:lstStyle/>
           <a:p>
             <a:r>
-              <a:rPr lang="pt-BR" dirty="0" smtClean="0"/>
+              <a:rPr lang="pt-BR" dirty="0"/>
               <a:t>2</a:t>
             </a:r>
           </a:p>
@@ -7342,13 +7199,6 @@
   <p:clrMapOvr>
     <a:masterClrMapping/>
   </p:clrMapOvr>
-  <p:timing>
-    <p:tnLst>
-      <p:par>
-        <p:cTn id="1" dur="indefinite" restart="never" nodeType="tmRoot"/>
-      </p:par>
-    </p:tnLst>
-  </p:timing>
 </p:sld>
 </file>
 
@@ -7381,7 +7231,7 @@
         </p:nvSpPr>
         <p:spPr>
           <a:xfrm>
-            <a:off x="-900608" y="-243408"/>
+            <a:off x="-1548680" y="-315416"/>
             <a:ext cx="8229600" cy="1600200"/>
           </a:xfrm>
         </p:spPr>
@@ -7390,22 +7240,44 @@
           <a:lstStyle/>
           <a:p>
             <a:r>
-              <a:rPr lang="pt-BR" dirty="0" smtClean="0"/>
-              <a:t>Algoritimo PPGA</a:t>
-            </a:r>
-            <a:endParaRPr lang="pt-BR" dirty="0"/>
+              <a:rPr lang="pt-BR" dirty="0"/>
+              <a:t>PPGA vs A*</a:t>
+            </a:r>
+          </a:p>
+        </p:txBody>
+      </p:sp>
+      <p:sp>
+        <p:nvSpPr>
+          <p:cNvPr id="8" name="Slide Number Placeholder 7"/>
+          <p:cNvSpPr>
+            <a:spLocks noGrp="1"/>
+          </p:cNvSpPr>
+          <p:nvPr>
+            <p:ph type="sldNum" sz="quarter" idx="12"/>
+          </p:nvPr>
+        </p:nvSpPr>
+        <p:spPr/>
+        <p:txBody>
+          <a:bodyPr/>
+          <a:lstStyle/>
+          <a:p>
+            <a:fld id="{79C11AB5-59D3-4802-88F3-6074105E3605}" type="slidenum">
+              <a:rPr lang="pt-BR" smtClean="0"/>
+              <a:t>20</a:t>
+            </a:fld>
+            <a:endParaRPr lang="pt-BR"/>
           </a:p>
         </p:txBody>
       </p:sp>
       <p:pic>
         <p:nvPicPr>
-          <p:cNvPr id="2051" name="Picture 3"/>
+          <p:cNvPr id="9" name="Imagem 2"/>
           <p:cNvPicPr>
-            <a:picLocks noChangeAspect="1" noChangeArrowheads="1"/>
+            <a:picLocks noChangeAspect="1"/>
           </p:cNvPicPr>
           <p:nvPr/>
         </p:nvPicPr>
-        <p:blipFill>
+        <p:blipFill rotWithShape="1">
           <a:blip r:embed="rId2">
             <a:extLst>
               <a:ext uri="{28A0092B-C50C-407E-A947-70E740481C1C}">
@@ -7413,220 +7285,100 @@
               </a:ext>
             </a:extLst>
           </a:blip>
-          <a:srcRect/>
-          <a:stretch>
-            <a:fillRect/>
-          </a:stretch>
+          <a:srcRect b="8195"/>
+          <a:stretch/>
         </p:blipFill>
-        <p:spPr bwMode="auto">
-          <a:xfrm>
-            <a:off x="444735" y="1628800"/>
-            <a:ext cx="5239036" cy="4680520"/>
+        <p:spPr>
+          <a:xfrm>
+            <a:off x="602221" y="1801018"/>
+            <a:ext cx="7920880" cy="3790157"/>
+          </a:xfrm>
+          <a:prstGeom prst="rect">
+            <a:avLst/>
+          </a:prstGeom>
+        </p:spPr>
+      </p:pic>
+      <p:sp>
+        <p:nvSpPr>
+          <p:cNvPr id="5" name="Rectangle 4"/>
+          <p:cNvSpPr/>
+          <p:nvPr/>
+        </p:nvSpPr>
+        <p:spPr>
+          <a:xfrm>
+            <a:off x="1619672" y="1446907"/>
+            <a:ext cx="6336703" cy="923330"/>
+          </a:xfrm>
+          <a:prstGeom prst="rect">
+            <a:avLst/>
+          </a:prstGeom>
+        </p:spPr>
+        <p:txBody>
+          <a:bodyPr wrap="square">
+            <a:spAutoFit/>
+          </a:bodyPr>
+          <a:lstStyle/>
+          <a:p>
+            <a:r>
+              <a:rPr lang="pt-BR" dirty="0"/>
+              <a:t>    A*                                                                      PPGA</a:t>
+            </a:r>
+          </a:p>
+          <a:p>
+            <a:pPr marL="285750" indent="-285750">
+              <a:buFont typeface="Arial" charset="0"/>
+              <a:buChar char="•"/>
+            </a:pPr>
+            <a:endParaRPr lang="pt-BR" dirty="0"/>
+          </a:p>
+          <a:p>
+            <a:pPr marL="285750" indent="-285750">
+              <a:buFont typeface="Arial" charset="0"/>
+              <a:buChar char="•"/>
+            </a:pPr>
+            <a:endParaRPr lang="pt-BR" dirty="0"/>
+          </a:p>
+        </p:txBody>
+      </p:sp>
+      <p:sp>
+        <p:nvSpPr>
+          <p:cNvPr id="6" name="TextBox 5"/>
+          <p:cNvSpPr txBox="1"/>
+          <p:nvPr/>
+        </p:nvSpPr>
+        <p:spPr>
+          <a:xfrm>
+            <a:off x="8588029" y="5225742"/>
+            <a:ext cx="453970" cy="369332"/>
           </a:xfrm>
           <a:prstGeom prst="rect">
             <a:avLst/>
           </a:prstGeom>
           <a:noFill/>
-          <a:ln>
-            <a:noFill/>
-          </a:ln>
-          <a:extLst>
-            <a:ext uri="{909E8E84-426E-40DD-AFC4-6F175D3DCCD1}">
-              <a14:hiddenFill xmlns:a14="http://schemas.microsoft.com/office/drawing/2010/main">
-                <a:solidFill>
-                  <a:schemeClr val="accent1"/>
-                </a:solidFill>
-              </a14:hiddenFill>
-            </a:ext>
-            <a:ext uri="{91240B29-F687-4F45-9708-019B960494DF}">
-              <a14:hiddenLine xmlns:a14="http://schemas.microsoft.com/office/drawing/2010/main" w="9525">
-                <a:solidFill>
-                  <a:schemeClr val="tx1"/>
-                </a:solidFill>
-                <a:miter lim="800000"/>
-                <a:headEnd/>
-                <a:tailEnd/>
-              </a14:hiddenLine>
-            </a:ext>
-          </a:extLst>
-        </p:spPr>
-      </p:pic>
-      <p:sp>
-        <p:nvSpPr>
-          <p:cNvPr id="8" name="Slide Number Placeholder 7"/>
-          <p:cNvSpPr>
-            <a:spLocks noGrp="1"/>
-          </p:cNvSpPr>
-          <p:nvPr>
-            <p:ph type="sldNum" sz="quarter" idx="12"/>
-          </p:nvPr>
-        </p:nvSpPr>
-        <p:spPr/>
-        <p:txBody>
-          <a:bodyPr/>
-          <a:lstStyle/>
-          <a:p>
-            <a:fld id="{79C11AB5-59D3-4802-88F3-6074105E3605}" type="slidenum">
-              <a:rPr lang="pt-BR" smtClean="0"/>
-              <a:t>20</a:t>
-            </a:fld>
-            <a:endParaRPr lang="pt-BR"/>
-          </a:p>
-        </p:txBody>
-      </p:sp>
-      <p:pic>
-        <p:nvPicPr>
-          <p:cNvPr id="2052" name="Picture 4"/>
-          <p:cNvPicPr>
-            <a:picLocks noChangeAspect="1" noChangeArrowheads="1"/>
-          </p:cNvPicPr>
-          <p:nvPr/>
-        </p:nvPicPr>
-        <p:blipFill>
-          <a:blip r:embed="rId3">
-            <a:extLst>
-              <a:ext uri="{28A0092B-C50C-407E-A947-70E740481C1C}">
-                <a14:useLocalDpi xmlns:a14="http://schemas.microsoft.com/office/drawing/2010/main" val="0"/>
-              </a:ext>
-            </a:extLst>
-          </a:blip>
-          <a:srcRect/>
-          <a:stretch>
-            <a:fillRect/>
-          </a:stretch>
-        </p:blipFill>
-        <p:spPr bwMode="auto">
-          <a:xfrm>
-            <a:off x="5652120" y="1628800"/>
-            <a:ext cx="3000727" cy="4464496"/>
-          </a:xfrm>
-          <a:prstGeom prst="rect">
-            <a:avLst/>
-          </a:prstGeom>
-          <a:noFill/>
-          <a:ln>
-            <a:noFill/>
-          </a:ln>
-          <a:extLst>
-            <a:ext uri="{909E8E84-426E-40DD-AFC4-6F175D3DCCD1}">
-              <a14:hiddenFill xmlns:a14="http://schemas.microsoft.com/office/drawing/2010/main">
-                <a:solidFill>
-                  <a:schemeClr val="accent1"/>
-                </a:solidFill>
-              </a14:hiddenFill>
-            </a:ext>
-            <a:ext uri="{91240B29-F687-4F45-9708-019B960494DF}">
-              <a14:hiddenLine xmlns:a14="http://schemas.microsoft.com/office/drawing/2010/main" w="9525">
-                <a:solidFill>
-                  <a:schemeClr val="tx1"/>
-                </a:solidFill>
-                <a:miter lim="800000"/>
-                <a:headEnd/>
-                <a:tailEnd/>
-              </a14:hiddenLine>
-            </a:ext>
-          </a:extLst>
-        </p:spPr>
-      </p:pic>
-      <p:sp>
-        <p:nvSpPr>
-          <p:cNvPr id="3" name="Rectangle 2"/>
-          <p:cNvSpPr/>
-          <p:nvPr/>
-        </p:nvSpPr>
-        <p:spPr>
-          <a:xfrm>
-            <a:off x="2580483" y="1608634"/>
-            <a:ext cx="4572000" cy="646331"/>
-          </a:xfrm>
-          <a:prstGeom prst="rect">
-            <a:avLst/>
-          </a:prstGeom>
-        </p:spPr>
-        <p:txBody>
-          <a:bodyPr>
+        </p:spPr>
+        <p:txBody>
+          <a:bodyPr wrap="none" rtlCol="0">
             <a:spAutoFit/>
           </a:bodyPr>
           <a:lstStyle/>
           <a:p>
-            <a:pPr algn="ctr"/>
-            <a:r>
-              <a:rPr lang="pt-BR" dirty="0" smtClean="0"/>
-              <a:t>O que </a:t>
-            </a:r>
-            <a:r>
-              <a:rPr lang="en-US" dirty="0" smtClean="0"/>
-              <a:t>é?</a:t>
-            </a:r>
-            <a:endParaRPr lang="pt-BR" dirty="0" smtClean="0"/>
-          </a:p>
-          <a:p>
-            <a:pPr algn="ctr"/>
-            <a:r>
-              <a:rPr lang="pt-BR" dirty="0" smtClean="0"/>
-              <a:t>Como ele funciona? </a:t>
-            </a:r>
-            <a:endParaRPr lang="pt-BR" dirty="0" smtClean="0"/>
-          </a:p>
-        </p:txBody>
-      </p:sp>
-      <p:sp>
-        <p:nvSpPr>
-          <p:cNvPr id="4" name="Right Arrow 3"/>
-          <p:cNvSpPr/>
-          <p:nvPr/>
-        </p:nvSpPr>
-        <p:spPr>
-          <a:xfrm>
-            <a:off x="5683771" y="3429000"/>
-            <a:ext cx="313002" cy="216024"/>
-          </a:xfrm>
-          <a:prstGeom prst="rightArrow">
-            <a:avLst/>
-          </a:prstGeom>
-        </p:spPr>
-        <p:style>
-          <a:lnRef idx="2">
-            <a:schemeClr val="accent1">
-              <a:shade val="50000"/>
-            </a:schemeClr>
-          </a:lnRef>
-          <a:fillRef idx="1">
-            <a:schemeClr val="accent1"/>
-          </a:fillRef>
-          <a:effectRef idx="0">
-            <a:schemeClr val="accent1"/>
-          </a:effectRef>
-          <a:fontRef idx="minor">
-            <a:schemeClr val="lt1"/>
-          </a:fontRef>
-        </p:style>
-        <p:txBody>
-          <a:bodyPr rtlCol="0" anchor="ctr"/>
-          <a:lstStyle/>
-          <a:p>
-            <a:pPr algn="ctr"/>
-            <a:endParaRPr lang="pt-BR"/>
+            <a:r>
+              <a:rPr lang="pt-BR" dirty="0"/>
+              <a:t>[4]</a:t>
+            </a:r>
           </a:p>
         </p:txBody>
       </p:sp>
     </p:spTree>
     <p:extLst>
       <p:ext uri="{BB962C8B-B14F-4D97-AF65-F5344CB8AC3E}">
-        <p14:creationId xmlns:p14="http://schemas.microsoft.com/office/powerpoint/2010/main" val="2261454126"/>
+        <p14:creationId xmlns:p14="http://schemas.microsoft.com/office/powerpoint/2010/main" val="2108523662"/>
       </p:ext>
     </p:extLst>
   </p:cSld>
   <p:clrMapOvr>
     <a:masterClrMapping/>
   </p:clrMapOvr>
-  <p:timing>
-    <p:tnLst>
-      <p:par>
-        <p:cTn id="1" dur="indefinite" restart="never" nodeType="tmRoot"/>
-      </p:par>
-    </p:tnLst>
-  </p:timing>
 </p:sld>
 </file>
 
@@ -7659,7 +7411,7 @@
         </p:nvSpPr>
         <p:spPr>
           <a:xfrm>
-            <a:off x="-1548680" y="-315416"/>
+            <a:off x="-1116632" y="-315416"/>
             <a:ext cx="8229600" cy="1600200"/>
           </a:xfrm>
         </p:spPr>
@@ -7668,10 +7420,9 @@
           <a:lstStyle/>
           <a:p>
             <a:r>
-              <a:rPr lang="pt-BR" dirty="0" smtClean="0"/>
-              <a:t>PPGA vs A*</a:t>
-            </a:r>
-            <a:endParaRPr lang="pt-BR" dirty="0"/>
+              <a:rPr lang="pt-BR" dirty="0"/>
+              <a:t>Tipos de Mapas</a:t>
+            </a:r>
           </a:p>
         </p:txBody>
       </p:sp>
@@ -7698,246 +7449,44 @@
           </a:p>
         </p:txBody>
       </p:sp>
-      <p:pic>
-        <p:nvPicPr>
-          <p:cNvPr id="9" name="Imagem 2"/>
-          <p:cNvPicPr>
-            <a:picLocks noChangeAspect="1"/>
-          </p:cNvPicPr>
+      <p:sp>
+        <p:nvSpPr>
+          <p:cNvPr id="3" name="Rectangle 2"/>
+          <p:cNvSpPr/>
           <p:nvPr/>
-        </p:nvPicPr>
-        <p:blipFill rotWithShape="1">
-          <a:blip r:embed="rId2">
-            <a:extLst>
-              <a:ext uri="{28A0092B-C50C-407E-A947-70E740481C1C}">
-                <a14:useLocalDpi xmlns:a14="http://schemas.microsoft.com/office/drawing/2010/main" val="0"/>
-              </a:ext>
-            </a:extLst>
-          </a:blip>
-          <a:srcRect b="8195"/>
-          <a:stretch/>
-        </p:blipFill>
+        </p:nvSpPr>
         <p:spPr>
           <a:xfrm>
-            <a:off x="602221" y="1801018"/>
-            <a:ext cx="7920880" cy="3790157"/>
+            <a:off x="971600" y="2204864"/>
+            <a:ext cx="1465466" cy="369332"/>
           </a:xfrm>
           <a:prstGeom prst="rect">
             <a:avLst/>
           </a:prstGeom>
         </p:spPr>
-      </p:pic>
-      <p:sp>
-        <p:nvSpPr>
-          <p:cNvPr id="5" name="Rectangle 4"/>
-          <p:cNvSpPr/>
-          <p:nvPr/>
-        </p:nvSpPr>
-        <p:spPr>
-          <a:xfrm>
-            <a:off x="1619672" y="1446907"/>
-            <a:ext cx="6336703" cy="923330"/>
-          </a:xfrm>
-          <a:prstGeom prst="rect">
-            <a:avLst/>
-          </a:prstGeom>
-        </p:spPr>
-        <p:txBody>
-          <a:bodyPr wrap="square">
+        <p:txBody>
+          <a:bodyPr wrap="none">
             <a:spAutoFit/>
           </a:bodyPr>
           <a:lstStyle/>
           <a:p>
             <a:r>
-              <a:rPr lang="pt-BR" dirty="0" smtClean="0"/>
-              <a:t>    A*                                                                      PPGA</a:t>
-            </a:r>
-          </a:p>
-          <a:p>
-            <a:pPr marL="285750" indent="-285750">
-              <a:buFont typeface="Arial" charset="0"/>
-              <a:buChar char="•"/>
-            </a:pPr>
-            <a:endParaRPr lang="pt-BR" dirty="0" smtClean="0"/>
-          </a:p>
-          <a:p>
-            <a:pPr marL="285750" indent="-285750">
-              <a:buFont typeface="Arial" charset="0"/>
-              <a:buChar char="•"/>
-            </a:pPr>
-            <a:endParaRPr lang="pt-BR" dirty="0" smtClean="0"/>
-          </a:p>
-        </p:txBody>
-      </p:sp>
-    </p:spTree>
-    <p:extLst>
-      <p:ext uri="{BB962C8B-B14F-4D97-AF65-F5344CB8AC3E}">
-        <p14:creationId xmlns:p14="http://schemas.microsoft.com/office/powerpoint/2010/main" val="38122523"/>
-      </p:ext>
-    </p:extLst>
-  </p:cSld>
-  <p:clrMapOvr>
-    <a:masterClrMapping/>
-  </p:clrMapOvr>
-  <p:timing>
-    <p:tnLst>
-      <p:par>
-        <p:cTn id="1" dur="indefinite" restart="never" nodeType="tmRoot"/>
-      </p:par>
-    </p:tnLst>
-  </p:timing>
-</p:sld>
-</file>
-
-<file path=ppt/slides/slide22.xml><?xml version="1.0" encoding="utf-8"?>
-<p:sld xmlns:a="http://schemas.openxmlformats.org/drawingml/2006/main" xmlns:r="http://schemas.openxmlformats.org/officeDocument/2006/relationships" xmlns:p="http://schemas.openxmlformats.org/presentationml/2006/main">
-  <p:cSld>
-    <p:spTree>
-      <p:nvGrpSpPr>
-        <p:cNvPr id="1" name=""/>
-        <p:cNvGrpSpPr/>
-        <p:nvPr/>
-      </p:nvGrpSpPr>
-      <p:grpSpPr>
-        <a:xfrm>
-          <a:off x="0" y="0"/>
-          <a:ext cx="0" cy="0"/>
-          <a:chOff x="0" y="0"/>
-          <a:chExt cx="0" cy="0"/>
-        </a:xfrm>
-      </p:grpSpPr>
-      <p:sp>
-        <p:nvSpPr>
-          <p:cNvPr id="2" name="Title 1"/>
-          <p:cNvSpPr>
-            <a:spLocks noGrp="1"/>
-          </p:cNvSpPr>
-          <p:nvPr>
-            <p:ph type="title"/>
-          </p:nvPr>
-        </p:nvSpPr>
-        <p:spPr>
-          <a:xfrm>
-            <a:off x="-1548680" y="-315416"/>
-            <a:ext cx="8229600" cy="1600200"/>
-          </a:xfrm>
-        </p:spPr>
-        <p:txBody>
-          <a:bodyPr/>
-          <a:lstStyle/>
-          <a:p>
-            <a:r>
-              <a:rPr lang="pt-BR" dirty="0" smtClean="0"/>
-              <a:t>PPGA vs A*</a:t>
-            </a:r>
-            <a:endParaRPr lang="pt-BR" dirty="0"/>
-          </a:p>
-        </p:txBody>
-      </p:sp>
-      <p:sp>
-        <p:nvSpPr>
-          <p:cNvPr id="8" name="Slide Number Placeholder 7"/>
-          <p:cNvSpPr>
-            <a:spLocks noGrp="1"/>
-          </p:cNvSpPr>
-          <p:nvPr>
-            <p:ph type="sldNum" sz="quarter" idx="12"/>
-          </p:nvPr>
-        </p:nvSpPr>
-        <p:spPr/>
-        <p:txBody>
-          <a:bodyPr/>
-          <a:lstStyle/>
-          <a:p>
-            <a:fld id="{79C11AB5-59D3-4802-88F3-6074105E3605}" type="slidenum">
-              <a:rPr lang="pt-BR" smtClean="0"/>
-              <a:t>22</a:t>
-            </a:fld>
-            <a:endParaRPr lang="pt-BR"/>
-          </a:p>
-        </p:txBody>
-      </p:sp>
-      <p:pic>
-        <p:nvPicPr>
-          <p:cNvPr id="9" name="Imagem 2"/>
-          <p:cNvPicPr>
-            <a:picLocks noChangeAspect="1"/>
-          </p:cNvPicPr>
-          <p:nvPr/>
-        </p:nvPicPr>
-        <p:blipFill rotWithShape="1">
-          <a:blip r:embed="rId2">
-            <a:extLst>
-              <a:ext uri="{28A0092B-C50C-407E-A947-70E740481C1C}">
-                <a14:useLocalDpi xmlns:a14="http://schemas.microsoft.com/office/drawing/2010/main" val="0"/>
-              </a:ext>
-            </a:extLst>
-          </a:blip>
-          <a:srcRect b="8195"/>
-          <a:stretch/>
-        </p:blipFill>
-        <p:spPr>
-          <a:xfrm>
-            <a:off x="602221" y="1801018"/>
-            <a:ext cx="7920880" cy="3790157"/>
-          </a:xfrm>
-          <a:prstGeom prst="rect">
-            <a:avLst/>
-          </a:prstGeom>
-        </p:spPr>
-      </p:pic>
-      <p:sp>
-        <p:nvSpPr>
-          <p:cNvPr id="5" name="Rectangle 4"/>
-          <p:cNvSpPr/>
-          <p:nvPr/>
-        </p:nvSpPr>
-        <p:spPr>
-          <a:xfrm>
-            <a:off x="1619672" y="1446907"/>
-            <a:ext cx="6336703" cy="923330"/>
-          </a:xfrm>
-          <a:prstGeom prst="rect">
-            <a:avLst/>
-          </a:prstGeom>
-        </p:spPr>
-        <p:txBody>
-          <a:bodyPr wrap="square">
-            <a:spAutoFit/>
-          </a:bodyPr>
-          <a:lstStyle/>
-          <a:p>
-            <a:r>
-              <a:rPr lang="pt-BR" dirty="0" smtClean="0"/>
-              <a:t>    A*                                                                      PPGA</a:t>
-            </a:r>
-          </a:p>
-          <a:p>
-            <a:pPr marL="285750" indent="-285750">
-              <a:buFont typeface="Arial" charset="0"/>
-              <a:buChar char="•"/>
-            </a:pPr>
-            <a:endParaRPr lang="pt-BR" dirty="0" smtClean="0"/>
-          </a:p>
-          <a:p>
-            <a:pPr marL="285750" indent="-285750">
-              <a:buFont typeface="Arial" charset="0"/>
-              <a:buChar char="•"/>
-            </a:pPr>
-            <a:endParaRPr lang="pt-BR" dirty="0" smtClean="0"/>
-          </a:p>
-        </p:txBody>
-      </p:sp>
-      <p:sp>
-        <p:nvSpPr>
-          <p:cNvPr id="6" name="TextBox 5"/>
+              <a:rPr lang="pt-BR" dirty="0"/>
+              <a:t>Com padrão</a:t>
+            </a:r>
+          </a:p>
+        </p:txBody>
+      </p:sp>
+      <p:sp>
+        <p:nvSpPr>
+          <p:cNvPr id="10" name="TextBox 9"/>
           <p:cNvSpPr txBox="1"/>
           <p:nvPr/>
         </p:nvSpPr>
         <p:spPr>
           <a:xfrm>
-            <a:off x="8588029" y="5225742"/>
-            <a:ext cx="453970" cy="369332"/>
+            <a:off x="6948264" y="2204864"/>
+            <a:ext cx="1407758" cy="369332"/>
           </a:xfrm>
           <a:prstGeom prst="rect">
             <a:avLst/>
@@ -7951,157 +7500,9 @@
           <a:lstStyle/>
           <a:p>
             <a:r>
-              <a:rPr lang="pt-BR" dirty="0" smtClean="0"/>
-              <a:t>[4]</a:t>
-            </a:r>
-            <a:endParaRPr lang="pt-BR" dirty="0"/>
-          </a:p>
-        </p:txBody>
-      </p:sp>
-    </p:spTree>
-    <p:extLst>
-      <p:ext uri="{BB962C8B-B14F-4D97-AF65-F5344CB8AC3E}">
-        <p14:creationId xmlns:p14="http://schemas.microsoft.com/office/powerpoint/2010/main" val="2108523662"/>
-      </p:ext>
-    </p:extLst>
-  </p:cSld>
-  <p:clrMapOvr>
-    <a:masterClrMapping/>
-  </p:clrMapOvr>
-  <p:timing>
-    <p:tnLst>
-      <p:par>
-        <p:cTn id="1" dur="indefinite" restart="never" nodeType="tmRoot"/>
-      </p:par>
-    </p:tnLst>
-  </p:timing>
-</p:sld>
-</file>
-
-<file path=ppt/slides/slide23.xml><?xml version="1.0" encoding="utf-8"?>
-<p:sld xmlns:a="http://schemas.openxmlformats.org/drawingml/2006/main" xmlns:r="http://schemas.openxmlformats.org/officeDocument/2006/relationships" xmlns:p="http://schemas.openxmlformats.org/presentationml/2006/main">
-  <p:cSld>
-    <p:spTree>
-      <p:nvGrpSpPr>
-        <p:cNvPr id="1" name=""/>
-        <p:cNvGrpSpPr/>
-        <p:nvPr/>
-      </p:nvGrpSpPr>
-      <p:grpSpPr>
-        <a:xfrm>
-          <a:off x="0" y="0"/>
-          <a:ext cx="0" cy="0"/>
-          <a:chOff x="0" y="0"/>
-          <a:chExt cx="0" cy="0"/>
-        </a:xfrm>
-      </p:grpSpPr>
-      <p:sp>
-        <p:nvSpPr>
-          <p:cNvPr id="2" name="Title 1"/>
-          <p:cNvSpPr>
-            <a:spLocks noGrp="1"/>
-          </p:cNvSpPr>
-          <p:nvPr>
-            <p:ph type="title"/>
-          </p:nvPr>
-        </p:nvSpPr>
-        <p:spPr>
-          <a:xfrm>
-            <a:off x="-1116632" y="-315416"/>
-            <a:ext cx="8229600" cy="1600200"/>
-          </a:xfrm>
-        </p:spPr>
-        <p:txBody>
-          <a:bodyPr/>
-          <a:lstStyle/>
-          <a:p>
-            <a:r>
-              <a:rPr lang="pt-BR" dirty="0" smtClean="0"/>
-              <a:t>Tipos de Mapas</a:t>
-            </a:r>
-            <a:endParaRPr lang="pt-BR" dirty="0"/>
-          </a:p>
-        </p:txBody>
-      </p:sp>
-      <p:sp>
-        <p:nvSpPr>
-          <p:cNvPr id="8" name="Slide Number Placeholder 7"/>
-          <p:cNvSpPr>
-            <a:spLocks noGrp="1"/>
-          </p:cNvSpPr>
-          <p:nvPr>
-            <p:ph type="sldNum" sz="quarter" idx="12"/>
-          </p:nvPr>
-        </p:nvSpPr>
-        <p:spPr/>
-        <p:txBody>
-          <a:bodyPr/>
-          <a:lstStyle/>
-          <a:p>
-            <a:fld id="{79C11AB5-59D3-4802-88F3-6074105E3605}" type="slidenum">
-              <a:rPr lang="pt-BR" smtClean="0"/>
-              <a:t>23</a:t>
-            </a:fld>
-            <a:endParaRPr lang="pt-BR"/>
-          </a:p>
-        </p:txBody>
-      </p:sp>
-      <p:sp>
-        <p:nvSpPr>
-          <p:cNvPr id="3" name="Rectangle 2"/>
-          <p:cNvSpPr/>
-          <p:nvPr/>
-        </p:nvSpPr>
-        <p:spPr>
-          <a:xfrm>
-            <a:off x="971600" y="2204864"/>
-            <a:ext cx="1465466" cy="369332"/>
-          </a:xfrm>
-          <a:prstGeom prst="rect">
-            <a:avLst/>
-          </a:prstGeom>
-        </p:spPr>
-        <p:txBody>
-          <a:bodyPr wrap="none">
-            <a:spAutoFit/>
-          </a:bodyPr>
-          <a:lstStyle/>
-          <a:p>
-            <a:r>
-              <a:rPr lang="pt-BR" dirty="0" smtClean="0"/>
-              <a:t>Com padrão</a:t>
-            </a:r>
-            <a:endParaRPr lang="pt-BR" dirty="0"/>
-          </a:p>
-        </p:txBody>
-      </p:sp>
-      <p:sp>
-        <p:nvSpPr>
-          <p:cNvPr id="10" name="TextBox 9"/>
-          <p:cNvSpPr txBox="1"/>
-          <p:nvPr/>
-        </p:nvSpPr>
-        <p:spPr>
-          <a:xfrm>
-            <a:off x="6948264" y="2204864"/>
-            <a:ext cx="1407758" cy="369332"/>
-          </a:xfrm>
-          <a:prstGeom prst="rect">
-            <a:avLst/>
-          </a:prstGeom>
-          <a:noFill/>
-        </p:spPr>
-        <p:txBody>
-          <a:bodyPr wrap="none" rtlCol="0">
-            <a:spAutoFit/>
-          </a:bodyPr>
-          <a:lstStyle/>
-          <a:p>
-            <a:r>
-              <a:rPr lang="pt-BR" dirty="0" smtClean="0"/>
+              <a:rPr lang="pt-BR" dirty="0"/>
               <a:t>Sem padrão</a:t>
             </a:r>
-            <a:endParaRPr lang="pt-BR" dirty="0"/>
           </a:p>
         </p:txBody>
       </p:sp>
@@ -8182,10 +7583,9 @@
           <a:lstStyle/>
           <a:p>
             <a:r>
-              <a:rPr lang="pt-BR" dirty="0" smtClean="0"/>
+              <a:rPr lang="pt-BR" dirty="0"/>
               <a:t>Misto</a:t>
             </a:r>
-            <a:endParaRPr lang="pt-BR" dirty="0"/>
           </a:p>
         </p:txBody>
       </p:sp>
@@ -8212,10 +7612,9 @@
           <a:lstStyle/>
           <a:p>
             <a:r>
-              <a:rPr lang="pt-BR" dirty="0" smtClean="0"/>
+              <a:rPr lang="pt-BR" dirty="0"/>
               <a:t>[4]</a:t>
             </a:r>
-            <a:endParaRPr lang="pt-BR" dirty="0"/>
           </a:p>
         </p:txBody>
       </p:sp>
@@ -8229,17 +7628,10 @@
   <p:clrMapOvr>
     <a:masterClrMapping/>
   </p:clrMapOvr>
-  <p:timing>
-    <p:tnLst>
-      <p:par>
-        <p:cTn id="1" dur="indefinite" restart="never" nodeType="tmRoot"/>
-      </p:par>
-    </p:tnLst>
-  </p:timing>
 </p:sld>
 </file>
 
-<file path=ppt/slides/slide24.xml><?xml version="1.0" encoding="utf-8"?>
+<file path=ppt/slides/slide22.xml><?xml version="1.0" encoding="utf-8"?>
 <p:sld xmlns:a="http://schemas.openxmlformats.org/drawingml/2006/main" xmlns:r="http://schemas.openxmlformats.org/officeDocument/2006/relationships" xmlns:p="http://schemas.openxmlformats.org/presentationml/2006/main">
   <p:cSld>
     <p:spTree>
@@ -8277,10 +7669,9 @@
           <a:lstStyle/>
           <a:p>
             <a:r>
-              <a:rPr lang="pt-BR" dirty="0" smtClean="0"/>
+              <a:rPr lang="pt-BR" dirty="0"/>
               <a:t>Objetivos</a:t>
             </a:r>
-            <a:endParaRPr lang="pt-BR" dirty="0"/>
           </a:p>
         </p:txBody>
       </p:sp>
@@ -8301,7 +7692,7 @@
           <a:p>
             <a:fld id="{79C11AB5-59D3-4802-88F3-6074105E3605}" type="slidenum">
               <a:rPr lang="pt-BR" smtClean="0"/>
-              <a:t>24</a:t>
+              <a:t>22</a:t>
             </a:fld>
             <a:endParaRPr lang="pt-BR"/>
           </a:p>
@@ -8334,16 +7725,8 @@
               <a:buChar char="•"/>
             </a:pPr>
             <a:r>
-              <a:rPr lang="pt-BR" sz="2400" dirty="0" smtClean="0"/>
-              <a:t>Criar uma base de testes com mapas em </a:t>
-            </a:r>
-            <a:r>
-              <a:rPr lang="pt-BR" sz="2400" dirty="0" smtClean="0"/>
-              <a:t>tamanhos </a:t>
-            </a:r>
-            <a:r>
-              <a:rPr lang="pt-BR" sz="2400" dirty="0" smtClean="0"/>
-              <a:t>padrões diferentes.</a:t>
+              <a:rPr lang="pt-BR" sz="2400" dirty="0"/>
+              <a:t>Criar uma base de testes com mapas em tamanhos padrões diferentes.</a:t>
             </a:r>
           </a:p>
           <a:p>
@@ -8352,14 +7735,9 @@
               <a:buChar char="•"/>
             </a:pPr>
             <a:r>
-              <a:rPr lang="pt-BR" sz="2400" dirty="0" smtClean="0"/>
-              <a:t>Implementar o Algoritmo A</a:t>
-            </a:r>
-            <a:r>
-              <a:rPr lang="pt-BR" sz="2400" dirty="0" smtClean="0"/>
-              <a:t>* e BFS</a:t>
-            </a:r>
-            <a:endParaRPr lang="pt-BR" sz="2400" dirty="0" smtClean="0"/>
+              <a:rPr lang="pt-BR" sz="2400" dirty="0"/>
+              <a:t>Implementar o Algoritmo A* e BFS</a:t>
+            </a:r>
           </a:p>
           <a:p>
             <a:pPr marL="285750" indent="-285750">
@@ -8367,10 +7745,9 @@
               <a:buChar char="•"/>
             </a:pPr>
             <a:r>
-              <a:rPr lang="pt-BR" sz="2400" dirty="0" smtClean="0"/>
+              <a:rPr lang="pt-BR" sz="2400" dirty="0"/>
               <a:t>Implementar o PPGA</a:t>
             </a:r>
-            <a:endParaRPr lang="pt-BR" sz="2400" dirty="0" smtClean="0"/>
           </a:p>
           <a:p>
             <a:pPr marL="285750" indent="-285750">
@@ -8378,7 +7755,7 @@
               <a:buChar char="•"/>
             </a:pPr>
             <a:r>
-              <a:rPr lang="pt-BR" sz="2400" dirty="0" smtClean="0"/>
+              <a:rPr lang="pt-BR" sz="2400" dirty="0"/>
               <a:t>Testar alterações no modulo de AG.</a:t>
             </a:r>
           </a:p>
@@ -8388,12 +7765,8 @@
               <a:buChar char="•"/>
             </a:pPr>
             <a:r>
-              <a:rPr lang="pt-BR" sz="2400" dirty="0" smtClean="0"/>
-              <a:t>Mensurar </a:t>
-            </a:r>
-            <a:r>
-              <a:rPr lang="pt-BR" sz="2400" dirty="0" smtClean="0"/>
-              <a:t>os resultados</a:t>
+              <a:rPr lang="pt-BR" sz="2400" dirty="0"/>
+              <a:t>Mensurar os resultados</a:t>
             </a:r>
           </a:p>
         </p:txBody>
@@ -8424,10 +7797,9 @@
               <a:buChar char="•"/>
             </a:pPr>
             <a:r>
-              <a:rPr lang="pt-BR" sz="2300" dirty="0" smtClean="0"/>
+              <a:rPr lang="pt-BR" sz="2300" dirty="0"/>
               <a:t>Otimizar o consumo de memória exigido pela busca de caminhos combinando AG com a heuristica do algoritimo de busca.</a:t>
             </a:r>
-            <a:endParaRPr lang="pt-BR" sz="2300" dirty="0"/>
           </a:p>
         </p:txBody>
       </p:sp>
@@ -8441,17 +7813,10 @@
   <p:clrMapOvr>
     <a:masterClrMapping/>
   </p:clrMapOvr>
-  <p:timing>
-    <p:tnLst>
-      <p:par>
-        <p:cTn id="1" dur="indefinite" restart="never" nodeType="tmRoot"/>
-      </p:par>
-    </p:tnLst>
-  </p:timing>
 </p:sld>
 </file>
 
-<file path=ppt/slides/slide25.xml><?xml version="1.0" encoding="utf-8"?>
+<file path=ppt/slides/slide23.xml><?xml version="1.0" encoding="utf-8"?>
 <p:sld xmlns:a="http://schemas.openxmlformats.org/drawingml/2006/main" xmlns:r="http://schemas.openxmlformats.org/officeDocument/2006/relationships" xmlns:p="http://schemas.openxmlformats.org/presentationml/2006/main">
   <p:cSld>
     <p:spTree>
@@ -8512,7 +7877,7 @@
           <a:p>
             <a:fld id="{79C11AB5-59D3-4802-88F3-6074105E3605}" type="slidenum">
               <a:rPr lang="pt-BR" smtClean="0"/>
-              <a:t>25</a:t>
+              <a:t>23</a:t>
             </a:fld>
             <a:endParaRPr lang="pt-BR"/>
           </a:p>
@@ -8544,7 +7909,7 @@
               <a:buChar char="•"/>
             </a:pPr>
             <a:r>
-              <a:rPr lang="pt-BR" dirty="0" smtClean="0">
+              <a:rPr lang="pt-BR" dirty="0">
                 <a:solidFill>
                   <a:schemeClr val="tx1"/>
                 </a:solidFill>
@@ -8558,7 +7923,7 @@
               <a:buChar char="•"/>
             </a:pPr>
             <a:r>
-              <a:rPr lang="pt-BR" dirty="0" smtClean="0">
+              <a:rPr lang="pt-BR" dirty="0">
                 <a:solidFill>
                   <a:schemeClr val="tx1"/>
                 </a:solidFill>
@@ -8566,7 +7931,7 @@
               <a:t>[2] LUCAS, D. C. Algoritmos gen</a:t>
             </a:r>
             <a:r>
-              <a:rPr lang="en-US" dirty="0" smtClean="0">
+              <a:rPr lang="en-US" dirty="0">
                 <a:solidFill>
                   <a:schemeClr val="tx1"/>
                 </a:solidFill>
@@ -8574,7 +7939,7 @@
               <a:t>é</a:t>
             </a:r>
             <a:r>
-              <a:rPr lang="pt-BR" dirty="0" smtClean="0">
+              <a:rPr lang="pt-BR" dirty="0">
                 <a:solidFill>
                   <a:schemeClr val="tx1"/>
                 </a:solidFill>
@@ -8582,7 +7947,7 @@
               <a:t>ticos: uma introdu</a:t>
             </a:r>
             <a:r>
-              <a:rPr lang="en-US" dirty="0" err="1" smtClean="0">
+              <a:rPr lang="en-US" dirty="0" err="1">
                 <a:solidFill>
                   <a:schemeClr val="tx1"/>
                 </a:solidFill>
@@ -8590,7 +7955,7 @@
               <a:t>çã</a:t>
             </a:r>
             <a:r>
-              <a:rPr lang="pt-BR" dirty="0" smtClean="0">
+              <a:rPr lang="pt-BR" dirty="0">
                 <a:solidFill>
                   <a:schemeClr val="tx1"/>
                 </a:solidFill>
@@ -8604,7 +7969,7 @@
               <a:buChar char="•"/>
             </a:pPr>
             <a:r>
-              <a:rPr lang="en-US" dirty="0" smtClean="0">
+              <a:rPr lang="en-US" dirty="0">
                 <a:solidFill>
                   <a:schemeClr val="tx1"/>
                 </a:solidFill>
@@ -8618,7 +7983,7 @@
               <a:buChar char="•"/>
             </a:pPr>
             <a:r>
-              <a:rPr lang="en-US" dirty="0" smtClean="0">
+              <a:rPr lang="en-US" dirty="0">
                 <a:solidFill>
                   <a:schemeClr val="tx1"/>
                 </a:solidFill>
@@ -8626,7 +7991,7 @@
               <a:t>[4] SANTOS, A. F. V. M. e. E. W. G. C. U. O. Pathfinding based on pattern detection using genetic algorithms. SBC - Proceedings of </a:t>
             </a:r>
             <a:r>
-              <a:rPr lang="en-US" dirty="0" err="1" smtClean="0">
+              <a:rPr lang="en-US" dirty="0" err="1">
                 <a:solidFill>
                   <a:schemeClr val="tx1"/>
                 </a:solidFill>
@@ -8634,7 +7999,7 @@
               <a:t>SBGames</a:t>
             </a:r>
             <a:r>
-              <a:rPr lang="en-US" dirty="0" smtClean="0">
+              <a:rPr lang="en-US" dirty="0">
                 <a:solidFill>
                   <a:schemeClr val="tx1"/>
                 </a:solidFill>
@@ -8647,7 +8012,7 @@
               <a:buFont typeface="Arial" charset="0"/>
               <a:buChar char="•"/>
             </a:pPr>
-            <a:endParaRPr lang="pt-BR" dirty="0" smtClean="0">
+            <a:endParaRPr lang="pt-BR" dirty="0">
               <a:solidFill>
                 <a:schemeClr val="tx1"/>
               </a:solidFill>
@@ -8665,17 +8030,10 @@
   <p:clrMapOvr>
     <a:masterClrMapping/>
   </p:clrMapOvr>
-  <p:timing>
-    <p:tnLst>
-      <p:par>
-        <p:cTn id="1" dur="indefinite" restart="never" nodeType="tmRoot"/>
-      </p:par>
-    </p:tnLst>
-  </p:timing>
 </p:sld>
 </file>
 
-<file path=ppt/slides/slide26.xml><?xml version="1.0" encoding="utf-8"?>
+<file path=ppt/slides/slide24.xml><?xml version="1.0" encoding="utf-8"?>
 <p:sld xmlns:a="http://schemas.openxmlformats.org/drawingml/2006/main" xmlns:r="http://schemas.openxmlformats.org/officeDocument/2006/relationships" xmlns:p="http://schemas.openxmlformats.org/presentationml/2006/main">
   <p:cSld>
     <p:bg>
@@ -8721,18 +8079,13 @@
           <a:lstStyle/>
           <a:p>
             <a:r>
-              <a:rPr lang="pt-BR" dirty="0" smtClean="0">
+              <a:rPr lang="pt-BR" dirty="0">
                 <a:solidFill>
                   <a:schemeClr val="bg1"/>
                 </a:solidFill>
               </a:rPr>
               <a:t>Obrigado.</a:t>
             </a:r>
-            <a:endParaRPr lang="pt-BR" dirty="0">
-              <a:solidFill>
-                <a:schemeClr val="bg1"/>
-              </a:solidFill>
-            </a:endParaRPr>
           </a:p>
         </p:txBody>
       </p:sp>
@@ -8753,7 +8106,7 @@
           <a:p>
             <a:fld id="{79C11AB5-59D3-4802-88F3-6074105E3605}" type="slidenum">
               <a:rPr lang="pt-BR" smtClean="0"/>
-              <a:t>26</a:t>
+              <a:t>24</a:t>
             </a:fld>
             <a:endParaRPr lang="pt-BR"/>
           </a:p>
@@ -8769,13 +8122,6 @@
   <p:clrMapOvr>
     <a:masterClrMapping/>
   </p:clrMapOvr>
-  <p:timing>
-    <p:tnLst>
-      <p:par>
-        <p:cTn id="1" dur="indefinite" restart="never" nodeType="tmRoot"/>
-      </p:par>
-    </p:tnLst>
-  </p:timing>
 </p:sld>
 </file>
 
@@ -8817,12 +8163,8 @@
           <a:lstStyle/>
           <a:p>
             <a:r>
-              <a:rPr lang="pt-BR" dirty="0" smtClean="0"/>
-              <a:t>Busca </a:t>
-            </a:r>
-            <a:r>
               <a:rPr lang="pt-BR" dirty="0"/>
-              <a:t>de caminho</a:t>
+              <a:t>Busca de caminho</a:t>
             </a:r>
           </a:p>
         </p:txBody>
@@ -8984,14 +8326,13 @@
           </a:bodyPr>
           <a:lstStyle/>
           <a:p>
-            <a:endParaRPr lang="pt-BR" sz="2000" dirty="0" smtClean="0"/>
-          </a:p>
-          <a:p>
-            <a:r>
-              <a:rPr lang="pt-BR" sz="2000" dirty="0" smtClean="0"/>
+            <a:endParaRPr lang="pt-BR" sz="2000" dirty="0"/>
+          </a:p>
+          <a:p>
+            <a:r>
+              <a:rPr lang="pt-BR" sz="2000" dirty="0"/>
               <a:t>O que é busca de caminho?</a:t>
             </a:r>
-            <a:endParaRPr lang="pt-BR" sz="2000" dirty="0" smtClean="0"/>
           </a:p>
         </p:txBody>
       </p:sp>
@@ -9011,7 +8352,7 @@
           <a:lstStyle/>
           <a:p>
             <a:r>
-              <a:rPr lang="pt-BR" dirty="0" smtClean="0"/>
+              <a:rPr lang="pt-BR" dirty="0"/>
               <a:t>2</a:t>
             </a:r>
           </a:p>
@@ -9240,13 +8581,8 @@
           <a:p>
             <a:r>
               <a:rPr lang="pt-BR" dirty="0"/>
-              <a:t>Algoritmo A</a:t>
-            </a:r>
-            <a:r>
-              <a:rPr lang="pt-BR" dirty="0" smtClean="0"/>
-              <a:t>* e BFS</a:t>
-            </a:r>
-            <a:endParaRPr lang="pt-BR" dirty="0"/>
+              <a:t>Algoritmo A* e BFS</a:t>
+            </a:r>
           </a:p>
         </p:txBody>
       </p:sp>
@@ -9438,13 +8774,8 @@
           <a:p>
             <a:r>
               <a:rPr lang="pt-BR" dirty="0"/>
-              <a:t>Algoritmo A</a:t>
-            </a:r>
-            <a:r>
-              <a:rPr lang="pt-BR" dirty="0" smtClean="0"/>
-              <a:t>* e BFS</a:t>
-            </a:r>
-            <a:endParaRPr lang="pt-BR" dirty="0"/>
+              <a:t>Algoritmo A* e BFS</a:t>
+            </a:r>
           </a:p>
         </p:txBody>
       </p:sp>
@@ -9655,10 +8986,9 @@
           <a:lstStyle/>
           <a:p>
             <a:r>
-              <a:rPr lang="pt-BR" dirty="0" smtClean="0"/>
+              <a:rPr lang="pt-BR" dirty="0"/>
               <a:t>Como funcionam? [3] </a:t>
             </a:r>
-            <a:endParaRPr lang="pt-BR" dirty="0" smtClean="0"/>
           </a:p>
         </p:txBody>
       </p:sp>
@@ -9672,13 +9002,6 @@
   <p:clrMapOvr>
     <a:masterClrMapping/>
   </p:clrMapOvr>
-  <p:timing>
-    <p:tnLst>
-      <p:par>
-        <p:cTn id="1" dur="indefinite" restart="never" nodeType="tmRoot"/>
-      </p:par>
-    </p:tnLst>
-  </p:timing>
 </p:sld>
 </file>
 
@@ -9721,13 +9044,8 @@
           <a:p>
             <a:r>
               <a:rPr lang="pt-BR" dirty="0"/>
-              <a:t>Algoritmo A</a:t>
-            </a:r>
-            <a:r>
-              <a:rPr lang="pt-BR" dirty="0" smtClean="0"/>
-              <a:t>* e BFS</a:t>
-            </a:r>
-            <a:endParaRPr lang="pt-BR" dirty="0"/>
+              <a:t>Algoritmo A* e BFS</a:t>
+            </a:r>
           </a:p>
         </p:txBody>
       </p:sp>
@@ -10412,13 +9730,6 @@
   <p:clrMapOvr>
     <a:masterClrMapping/>
   </p:clrMapOvr>
-  <p:timing>
-    <p:tnLst>
-      <p:par>
-        <p:cTn id="1" dur="indefinite" restart="never" nodeType="tmRoot"/>
-      </p:par>
-    </p:tnLst>
-  </p:timing>
 </p:sld>
 </file>
 
@@ -10461,13 +9772,8 @@
           <a:p>
             <a:r>
               <a:rPr lang="pt-BR" dirty="0"/>
-              <a:t>Algoritmo A</a:t>
-            </a:r>
-            <a:r>
-              <a:rPr lang="pt-BR" dirty="0" smtClean="0"/>
-              <a:t>* e BFS</a:t>
-            </a:r>
-            <a:endParaRPr lang="pt-BR" dirty="0"/>
+              <a:t>Algoritmo A* e BFS</a:t>
+            </a:r>
           </a:p>
         </p:txBody>
       </p:sp>
@@ -11098,13 +10404,6 @@
   <p:clrMapOvr>
     <a:masterClrMapping/>
   </p:clrMapOvr>
-  <p:timing>
-    <p:tnLst>
-      <p:par>
-        <p:cTn id="1" dur="indefinite" restart="never" nodeType="tmRoot"/>
-      </p:par>
-    </p:tnLst>
-  </p:timing>
 </p:sld>
 </file>
 
@@ -11147,13 +10446,8 @@
           <a:p>
             <a:r>
               <a:rPr lang="pt-BR" dirty="0"/>
-              <a:t>Algoritmo A</a:t>
-            </a:r>
-            <a:r>
-              <a:rPr lang="pt-BR" dirty="0" smtClean="0"/>
-              <a:t>* e BFS</a:t>
-            </a:r>
-            <a:endParaRPr lang="pt-BR" dirty="0"/>
+              <a:t>Algoritmo A* e BFS</a:t>
+            </a:r>
           </a:p>
         </p:txBody>
       </p:sp>
@@ -11730,13 +11024,6 @@
   <p:clrMapOvr>
     <a:masterClrMapping/>
   </p:clrMapOvr>
-  <p:timing>
-    <p:tnLst>
-      <p:par>
-        <p:cTn id="1" dur="indefinite" restart="never" nodeType="tmRoot"/>
-      </p:par>
-    </p:tnLst>
-  </p:timing>
 </p:sld>
 </file>
 
@@ -11779,13 +11066,8 @@
           <a:p>
             <a:r>
               <a:rPr lang="pt-BR" dirty="0"/>
-              <a:t>Algoritmo A</a:t>
-            </a:r>
-            <a:r>
-              <a:rPr lang="pt-BR" dirty="0" smtClean="0"/>
-              <a:t>* e BFS</a:t>
-            </a:r>
-            <a:endParaRPr lang="pt-BR" dirty="0"/>
+              <a:t>Algoritmo A* e BFS</a:t>
+            </a:r>
           </a:p>
         </p:txBody>
       </p:sp>
@@ -12254,13 +11536,6 @@
   <p:clrMapOvr>
     <a:masterClrMapping/>
   </p:clrMapOvr>
-  <p:timing>
-    <p:tnLst>
-      <p:par>
-        <p:cTn id="1" dur="indefinite" restart="never" nodeType="tmRoot"/>
-      </p:par>
-    </p:tnLst>
-  </p:timing>
 </p:sld>
 </file>
 

</xml_diff>